<commit_message>
Fix PPT quality: add 7 charts, unify English, strip CJK, format KPIs
Addresses regression vs old enhanced PPT:
- Charts: 9 → 16 images (0.23 → 0.41 per page), added market share,
  revenue trend, revenue breakdown, segment metrics bar charts
- Language: remove all Chinese subtitles/headers, use English-only
  with UPPERCASE section labels (matching professional style)
- Add _strip_cjk() to sanitize CJK from engine data before display
- Format KPI metric cards with €/% units and YoY change indicators
- Fix section dividers and TOC from Chinese to English
- Revenue breakdown shows bar chart instead of raw text bullets
- Segment pages show metrics bar chart alongside changes/attributions

Co-Authored-By: Claude Opus 4.6 <noreply@anthropic.com>
</commit_message>
<xml_diff>
--- a/data/output/blm_vodafone_germany_q3fy26_v2_draft.pptx
+++ b/data/output/blm_vodafone_germany_q3fy26_v2_draft.pptx
@@ -3732,7 +3732,7 @@
               </a:defRPr>
             </a:pPr>
             <a:r>
-              <a:t>01 Trends (PEST) | 02 Market/Customer ($APPEALS) | 03 Competition (Porter) | 04 Self (BMC) | SWOT Synthesis | 05 Opportunities (SPAN)</a:t>
+              <a:t>01 Trends (PEST) | 02 Market/Customer ($APPEALS) | 03 Competition (Porter) | 04 Self (BMC) | SWOT Synthesis | 05 Opportunities (SPAN</a:t>
             </a:r>
           </a:p>
         </p:txBody>
@@ -3865,7 +3865,7 @@
               </a:defRPr>
             </a:pPr>
             <a:r>
-              <a:t>市场变化全景</a:t>
+              <a:t>MARKET OVERVIEW</a:t>
             </a:r>
           </a:p>
         </p:txBody>
@@ -3980,7 +3980,7 @@
               </a:defRPr>
             </a:pPr>
             <a:r>
-              <a:t>Total Revenue</a:t>
+              <a:t>Total Revenue (€M</a:t>
             </a:r>
           </a:p>
         </p:txBody>
@@ -4016,7 +4016,7 @@
               </a:defRPr>
             </a:pPr>
             <a:r>
-              <a:t>12327.0</a:t>
+              <a:t>12,327</a:t>
             </a:r>
           </a:p>
         </p:txBody>
@@ -4095,7 +4095,7 @@
               </a:defRPr>
             </a:pPr>
             <a:r>
-              <a:t>Mobile Subs (K)</a:t>
+              <a:t>Mobile Subs (K</a:t>
             </a:r>
           </a:p>
         </p:txBody>
@@ -4131,7 +4131,7 @@
               </a:defRPr>
             </a:pPr>
             <a:r>
-              <a:t>143100.0</a:t>
+              <a:t>143,100</a:t>
             </a:r>
           </a:p>
         </p:txBody>
@@ -4210,7 +4210,7 @@
               </a:defRPr>
             </a:pPr>
             <a:r>
-              <a:t>Broadband Subs (K)</a:t>
+              <a:t>Broadband Subs (K</a:t>
             </a:r>
           </a:p>
         </p:txBody>
@@ -4246,7 +4246,7 @@
               </a:defRPr>
             </a:pPr>
             <a:r>
-              <a:t>31420.0</a:t>
+              <a:t>31,420</a:t>
             </a:r>
           </a:p>
         </p:txBody>
@@ -4366,16 +4366,40 @@
           </a:p>
         </p:txBody>
       </p:sp>
-      <p:sp>
-        <p:nvSpPr>
-          <p:cNvPr id="18" name="TextBox 17"/>
+      <p:pic>
+        <p:nvPicPr>
+          <p:cNvPr id="18" name="Picture 17" descr="market_share.png"/>
+          <p:cNvPicPr>
+            <a:picLocks noChangeAspect="1"/>
+          </p:cNvPicPr>
+          <p:nvPr/>
+        </p:nvPicPr>
+        <p:blipFill>
+          <a:blip r:embed="rId2"/>
+          <a:stretch>
+            <a:fillRect/>
+          </a:stretch>
+        </p:blipFill>
+        <p:spPr>
+          <a:xfrm>
+            <a:off x="5943600" y="2560320"/>
+            <a:ext cx="5486400" cy="2926080"/>
+          </a:xfrm>
+          <a:prstGeom prst="rect">
+            <a:avLst/>
+          </a:prstGeom>
+        </p:spPr>
+      </p:pic>
+      <p:sp>
+        <p:nvSpPr>
+          <p:cNvPr id="19" name="TextBox 18"/>
           <p:cNvSpPr txBox="1"/>
           <p:nvPr/>
         </p:nvSpPr>
         <p:spPr>
           <a:xfrm>
             <a:off x="457200" y="2743200"/>
-            <a:ext cx="4572000" cy="274320"/>
+            <a:ext cx="5029200" cy="274320"/>
           </a:xfrm>
           <a:prstGeom prst="rect">
             <a:avLst/>
@@ -4404,14 +4428,14 @@
       </p:sp>
       <p:sp>
         <p:nvSpPr>
-          <p:cNvPr id="19" name="TextBox 18"/>
+          <p:cNvPr id="20" name="TextBox 19"/>
           <p:cNvSpPr txBox="1"/>
           <p:nvPr/>
         </p:nvSpPr>
         <p:spPr>
           <a:xfrm>
             <a:off x="457200" y="3017520"/>
-            <a:ext cx="10972800" cy="2286000"/>
+            <a:ext cx="5029200" cy="2286000"/>
           </a:xfrm>
           <a:prstGeom prst="rect">
             <a:avLst/>
@@ -4487,43 +4511,11 @@
               <a:t>• Deutsche Telekom Q3 2025: revenue +1.5%, net profit +14.3%</a:t>
             </a:r>
           </a:p>
-          <a:p>
-            <a:pPr>
-              <a:spcAft>
-                <a:spcPts val="400"/>
-              </a:spcAft>
-              <a:defRPr sz="1100">
-                <a:solidFill>
-                  <a:srgbClr val="333333"/>
-                </a:solidFill>
-                <a:latin typeface="Arial"/>
-              </a:defRPr>
-            </a:pPr>
-            <a:r>
-              <a:t>• Vodafone restructures cable TV frequencies nationwide</a:t>
-            </a:r>
-          </a:p>
-          <a:p>
-            <a:pPr>
-              <a:spcAft>
-                <a:spcPts val="400"/>
-              </a:spcAft>
-              <a:defRPr sz="1100">
-                <a:solidFill>
-                  <a:srgbClr val="333333"/>
-                </a:solidFill>
-                <a:latin typeface="Arial"/>
-              </a:defRPr>
-            </a:pPr>
-            <a:r>
-              <a:t>• DT reboots fibre tactics, targets Vodafone cable footprint</a:t>
-            </a:r>
-          </a:p>
-        </p:txBody>
-      </p:sp>
-      <p:sp>
-        <p:nvSpPr>
-          <p:cNvPr id="20" name="Rectangle 19"/>
+        </p:txBody>
+      </p:sp>
+      <p:sp>
+        <p:nvSpPr>
+          <p:cNvPr id="21" name="Rectangle 20"/>
           <p:cNvSpPr/>
           <p:nvPr/>
         </p:nvSpPr>
@@ -4566,7 +4558,7 @@
       </p:sp>
       <p:sp>
         <p:nvSpPr>
-          <p:cNvPr id="21" name="TextBox 20"/>
+          <p:cNvPr id="22" name="TextBox 21"/>
           <p:cNvSpPr txBox="1"/>
           <p:nvPr/>
         </p:nvSpPr>
@@ -4728,7 +4720,7 @@
               </a:defRPr>
             </a:pPr>
             <a:r>
-              <a:t>客户细分</a:t>
+              <a:t>SEGMENTATION</a:t>
             </a:r>
           </a:p>
         </p:txBody>
@@ -5580,7 +5572,7 @@
               </a:defRPr>
             </a:pPr>
             <a:r>
-              <a:t>客户需求评估</a:t>
+              <a:t>CUSTOMER NEEDS</a:t>
             </a:r>
           </a:p>
         </p:txBody>
@@ -5852,7 +5844,7 @@
               </a:defRPr>
             </a:pPr>
             <a:r>
-              <a:t>客户价值迁移</a:t>
+              <a:t>VALUE MIGRATION</a:t>
             </a:r>
           </a:p>
         </p:txBody>
@@ -6223,7 +6215,7 @@
               </a:defRPr>
             </a:pPr>
             <a:r>
-              <a:t>03 看竞争</a:t>
+              <a:t>03 Look at Competition</a:t>
             </a:r>
           </a:p>
         </p:txBody>
@@ -6259,7 +6251,7 @@
               </a:defRPr>
             </a:pPr>
             <a:r>
-              <a:t>Look at Competition — Porter's Five Forces</a:t>
+              <a:t>Porter's Five Forces — Competitive Landscape</a:t>
             </a:r>
           </a:p>
         </p:txBody>
@@ -6392,7 +6384,7 @@
               </a:defRPr>
             </a:pPr>
             <a:r>
-              <a:t>波特五力分析</a:t>
+              <a:t>COMPETITIVE FORCES</a:t>
             </a:r>
           </a:p>
         </p:txBody>
@@ -6700,7 +6692,7 @@
               </a:defRPr>
             </a:pPr>
             <a:r>
-              <a:t>竞争对手分析</a:t>
+              <a:t>COMPETITOR DEEP DIVE</a:t>
             </a:r>
           </a:p>
         </p:txBody>
@@ -6815,7 +6807,7 @@
               </a:defRPr>
             </a:pPr>
             <a:r>
-              <a:t>Status</a:t>
+              <a:t>Revenue</a:t>
             </a:r>
           </a:p>
         </p:txBody>
@@ -6851,14 +6843,50 @@
               </a:defRPr>
             </a:pPr>
             <a:r>
-              <a:t>data_available</a:t>
-            </a:r>
-          </a:p>
-        </p:txBody>
-      </p:sp>
-      <p:sp>
-        <p:nvSpPr>
-          <p:cNvPr id="9" name="Rectangle 8"/>
+              <a:t>€2,000M</a:t>
+            </a:r>
+          </a:p>
+        </p:txBody>
+      </p:sp>
+      <p:sp>
+        <p:nvSpPr>
+          <p:cNvPr id="9" name="TextBox 8"/>
+          <p:cNvSpPr txBox="1"/>
+          <p:nvPr/>
+        </p:nvSpPr>
+        <p:spPr>
+          <a:xfrm>
+            <a:off x="594360" y="2057400"/>
+            <a:ext cx="2286000" cy="228600"/>
+          </a:xfrm>
+          <a:prstGeom prst="rect">
+            <a:avLst/>
+          </a:prstGeom>
+          <a:noFill/>
+        </p:spPr>
+        <p:txBody>
+          <a:bodyPr wrap="square">
+            <a:spAutoFit/>
+          </a:bodyPr>
+          <a:lstStyle/>
+          <a:p>
+            <a:pPr algn="l">
+              <a:defRPr sz="1000" b="0">
+                <a:solidFill>
+                  <a:srgbClr val="C80000"/>
+                </a:solidFill>
+                <a:latin typeface="Arial"/>
+              </a:defRPr>
+            </a:pPr>
+            <a:r>
+              <a:t>-3.4% YoY</a:t>
+            </a:r>
+          </a:p>
+        </p:txBody>
+      </p:sp>
+      <p:sp>
+        <p:nvSpPr>
+          <p:cNvPr id="10" name="Rectangle 9"/>
           <p:cNvSpPr/>
           <p:nvPr/>
         </p:nvSpPr>
@@ -6901,7 +6929,7 @@
       </p:sp>
       <p:sp>
         <p:nvSpPr>
-          <p:cNvPr id="10" name="TextBox 9"/>
+          <p:cNvPr id="11" name="TextBox 10"/>
           <p:cNvSpPr txBox="1"/>
           <p:nvPr/>
         </p:nvSpPr>
@@ -6930,14 +6958,14 @@
               </a:defRPr>
             </a:pPr>
             <a:r>
-              <a:t>Latest Quarter</a:t>
-            </a:r>
-          </a:p>
-        </p:txBody>
-      </p:sp>
-      <p:sp>
-        <p:nvSpPr>
-          <p:cNvPr id="11" name="TextBox 10"/>
+              <a:t>EBITDA</a:t>
+            </a:r>
+          </a:p>
+        </p:txBody>
+      </p:sp>
+      <p:sp>
+        <p:nvSpPr>
+          <p:cNvPr id="12" name="TextBox 11"/>
           <p:cNvSpPr txBox="1"/>
           <p:nvPr/>
         </p:nvSpPr>
@@ -6966,14 +6994,14 @@
               </a:defRPr>
             </a:pPr>
             <a:r>
-              <a:t>CQ4_2025</a:t>
-            </a:r>
-          </a:p>
-        </p:txBody>
-      </p:sp>
-      <p:sp>
-        <p:nvSpPr>
-          <p:cNvPr id="12" name="Rectangle 11"/>
+              <a:t>€650M</a:t>
+            </a:r>
+          </a:p>
+        </p:txBody>
+      </p:sp>
+      <p:sp>
+        <p:nvSpPr>
+          <p:cNvPr id="13" name="Rectangle 12"/>
           <p:cNvSpPr/>
           <p:nvPr/>
         </p:nvSpPr>
@@ -7016,7 +7044,7 @@
       </p:sp>
       <p:sp>
         <p:nvSpPr>
-          <p:cNvPr id="13" name="TextBox 12"/>
+          <p:cNvPr id="14" name="TextBox 13"/>
           <p:cNvSpPr txBox="1"/>
           <p:nvPr/>
         </p:nvSpPr>
@@ -7045,14 +7073,14 @@
               </a:defRPr>
             </a:pPr>
             <a:r>
-              <a:t>Revenue</a:t>
-            </a:r>
-          </a:p>
-        </p:txBody>
-      </p:sp>
-      <p:sp>
-        <p:nvSpPr>
-          <p:cNvPr id="14" name="TextBox 13"/>
+              <a:t>Margin</a:t>
+            </a:r>
+          </a:p>
+        </p:txBody>
+      </p:sp>
+      <p:sp>
+        <p:nvSpPr>
+          <p:cNvPr id="15" name="TextBox 14"/>
           <p:cNvSpPr txBox="1"/>
           <p:nvPr/>
         </p:nvSpPr>
@@ -7081,14 +7109,14 @@
               </a:defRPr>
             </a:pPr>
             <a:r>
-              <a:t>2000.0</a:t>
-            </a:r>
-          </a:p>
-        </p:txBody>
-      </p:sp>
-      <p:sp>
-        <p:nvSpPr>
-          <p:cNvPr id="15" name="Rectangle 14"/>
+              <a:t>32.5%</a:t>
+            </a:r>
+          </a:p>
+        </p:txBody>
+      </p:sp>
+      <p:sp>
+        <p:nvSpPr>
+          <p:cNvPr id="16" name="Rectangle 15"/>
           <p:cNvSpPr/>
           <p:nvPr/>
         </p:nvSpPr>
@@ -7131,7 +7159,7 @@
       </p:sp>
       <p:sp>
         <p:nvSpPr>
-          <p:cNvPr id="16" name="TextBox 15"/>
+          <p:cNvPr id="17" name="TextBox 16"/>
           <p:cNvSpPr txBox="1"/>
           <p:nvPr/>
         </p:nvSpPr>
@@ -7160,14 +7188,14 @@
               </a:defRPr>
             </a:pPr>
             <a:r>
-              <a:t>Service Revenue</a:t>
-            </a:r>
-          </a:p>
-        </p:txBody>
-      </p:sp>
-      <p:sp>
-        <p:nvSpPr>
-          <p:cNvPr id="17" name="TextBox 16"/>
+              <a:t>Capex/Rev</a:t>
+            </a:r>
+          </a:p>
+        </p:txBody>
+      </p:sp>
+      <p:sp>
+        <p:nvSpPr>
+          <p:cNvPr id="18" name="TextBox 17"/>
           <p:cNvSpPr txBox="1"/>
           <p:nvPr/>
         </p:nvSpPr>
@@ -7196,14 +7224,14 @@
               </a:defRPr>
             </a:pPr>
             <a:r>
-              <a:t>1700.0</a:t>
-            </a:r>
-          </a:p>
-        </p:txBody>
-      </p:sp>
-      <p:sp>
-        <p:nvSpPr>
-          <p:cNvPr id="18" name="TextBox 17"/>
+              <a:t>25.0%</a:t>
+            </a:r>
+          </a:p>
+        </p:txBody>
+      </p:sp>
+      <p:sp>
+        <p:nvSpPr>
+          <p:cNvPr id="19" name="TextBox 18"/>
           <p:cNvSpPr txBox="1"/>
           <p:nvPr/>
         </p:nvSpPr>
@@ -7239,7 +7267,7 @@
       </p:sp>
       <p:sp>
         <p:nvSpPr>
-          <p:cNvPr id="19" name="TextBox 18"/>
+          <p:cNvPr id="20" name="TextBox 19"/>
           <p:cNvSpPr txBox="1"/>
           <p:nvPr/>
         </p:nvSpPr>
@@ -7322,27 +7350,11 @@
               <a:t>• Network Coverage: 85.0/100</a:t>
             </a:r>
           </a:p>
-          <a:p>
-            <a:pPr>
-              <a:spcAft>
-                <a:spcPts val="400"/>
-              </a:spcAft>
-              <a:defRPr sz="1100">
-                <a:solidFill>
-                  <a:srgbClr val="333333"/>
-                </a:solidFill>
-                <a:latin typeface="Arial"/>
-              </a:defRPr>
-            </a:pPr>
-            <a:r>
-              <a:t>• Network Quality: 78.0/100</a:t>
-            </a:r>
-          </a:p>
-        </p:txBody>
-      </p:sp>
-      <p:sp>
-        <p:nvSpPr>
-          <p:cNvPr id="20" name="TextBox 19"/>
+        </p:txBody>
+      </p:sp>
+      <p:sp>
+        <p:nvSpPr>
+          <p:cNvPr id="21" name="TextBox 20"/>
           <p:cNvSpPr txBox="1"/>
           <p:nvPr/>
         </p:nvSpPr>
@@ -7378,7 +7390,7 @@
       </p:sp>
       <p:sp>
         <p:nvSpPr>
-          <p:cNvPr id="21" name="TextBox 20"/>
+          <p:cNvPr id="22" name="TextBox 21"/>
           <p:cNvSpPr txBox="1"/>
           <p:nvPr/>
         </p:nvSpPr>
@@ -7402,7 +7414,7 @@
       </p:sp>
       <p:sp>
         <p:nvSpPr>
-          <p:cNvPr id="22" name="Rectangle 21"/>
+          <p:cNvPr id="23" name="Rectangle 22"/>
           <p:cNvSpPr/>
           <p:nvPr/>
         </p:nvSpPr>
@@ -7445,7 +7457,7 @@
       </p:sp>
       <p:sp>
         <p:nvSpPr>
-          <p:cNvPr id="23" name="TextBox 22"/>
+          <p:cNvPr id="24" name="TextBox 23"/>
           <p:cNvSpPr txBox="1"/>
           <p:nvPr/>
         </p:nvSpPr>
@@ -7474,7 +7486,7 @@
               </a:defRPr>
             </a:pPr>
             <a:r>
-              <a:t>Key Message: Competitor analysis: telefonica_o2</a:t>
+              <a:t>Key Message: Competitor analysis: Telefonica O2</a:t>
             </a:r>
           </a:p>
         </p:txBody>
@@ -7607,7 +7619,7 @@
               </a:defRPr>
             </a:pPr>
             <a:r>
-              <a:t>竞争对手分析</a:t>
+              <a:t>COMPETITOR DEEP DIVE</a:t>
             </a:r>
           </a:p>
         </p:txBody>
@@ -7722,7 +7734,7 @@
               </a:defRPr>
             </a:pPr>
             <a:r>
-              <a:t>Status</a:t>
+              <a:t>Revenue</a:t>
             </a:r>
           </a:p>
         </p:txBody>
@@ -7758,14 +7770,50 @@
               </a:defRPr>
             </a:pPr>
             <a:r>
-              <a:t>data_available</a:t>
-            </a:r>
-          </a:p>
-        </p:txBody>
-      </p:sp>
-      <p:sp>
-        <p:nvSpPr>
-          <p:cNvPr id="9" name="Rectangle 8"/>
+              <a:t>€6,200M</a:t>
+            </a:r>
+          </a:p>
+        </p:txBody>
+      </p:sp>
+      <p:sp>
+        <p:nvSpPr>
+          <p:cNvPr id="9" name="TextBox 8"/>
+          <p:cNvSpPr txBox="1"/>
+          <p:nvPr/>
+        </p:nvSpPr>
+        <p:spPr>
+          <a:xfrm>
+            <a:off x="594360" y="2057400"/>
+            <a:ext cx="2286000" cy="228600"/>
+          </a:xfrm>
+          <a:prstGeom prst="rect">
+            <a:avLst/>
+          </a:prstGeom>
+          <a:noFill/>
+        </p:spPr>
+        <p:txBody>
+          <a:bodyPr wrap="square">
+            <a:spAutoFit/>
+          </a:bodyPr>
+          <a:lstStyle/>
+          <a:p>
+            <a:pPr algn="l">
+              <a:defRPr sz="1000" b="0">
+                <a:solidFill>
+                  <a:srgbClr val="008000"/>
+                </a:solidFill>
+                <a:latin typeface="Arial"/>
+              </a:defRPr>
+            </a:pPr>
+            <a:r>
+              <a:t>+1.1% YoY</a:t>
+            </a:r>
+          </a:p>
+        </p:txBody>
+      </p:sp>
+      <p:sp>
+        <p:nvSpPr>
+          <p:cNvPr id="10" name="Rectangle 9"/>
           <p:cNvSpPr/>
           <p:nvPr/>
         </p:nvSpPr>
@@ -7808,7 +7856,7 @@
       </p:sp>
       <p:sp>
         <p:nvSpPr>
-          <p:cNvPr id="10" name="TextBox 9"/>
+          <p:cNvPr id="11" name="TextBox 10"/>
           <p:cNvSpPr txBox="1"/>
           <p:nvPr/>
         </p:nvSpPr>
@@ -7837,14 +7885,14 @@
               </a:defRPr>
             </a:pPr>
             <a:r>
-              <a:t>Latest Quarter</a:t>
-            </a:r>
-          </a:p>
-        </p:txBody>
-      </p:sp>
-      <p:sp>
-        <p:nvSpPr>
-          <p:cNvPr id="11" name="TextBox 10"/>
+              <a:t>EBITDA</a:t>
+            </a:r>
+          </a:p>
+        </p:txBody>
+      </p:sp>
+      <p:sp>
+        <p:nvSpPr>
+          <p:cNvPr id="12" name="TextBox 11"/>
           <p:cNvSpPr txBox="1"/>
           <p:nvPr/>
         </p:nvSpPr>
@@ -7873,14 +7921,14 @@
               </a:defRPr>
             </a:pPr>
             <a:r>
-              <a:t>CQ4_2025</a:t>
-            </a:r>
-          </a:p>
-        </p:txBody>
-      </p:sp>
-      <p:sp>
-        <p:nvSpPr>
-          <p:cNvPr id="12" name="Rectangle 11"/>
+              <a:t>€2,610M</a:t>
+            </a:r>
+          </a:p>
+        </p:txBody>
+      </p:sp>
+      <p:sp>
+        <p:nvSpPr>
+          <p:cNvPr id="13" name="Rectangle 12"/>
           <p:cNvSpPr/>
           <p:nvPr/>
         </p:nvSpPr>
@@ -7923,7 +7971,7 @@
       </p:sp>
       <p:sp>
         <p:nvSpPr>
-          <p:cNvPr id="13" name="TextBox 12"/>
+          <p:cNvPr id="14" name="TextBox 13"/>
           <p:cNvSpPr txBox="1"/>
           <p:nvPr/>
         </p:nvSpPr>
@@ -7952,14 +8000,14 @@
               </a:defRPr>
             </a:pPr>
             <a:r>
-              <a:t>Revenue</a:t>
-            </a:r>
-          </a:p>
-        </p:txBody>
-      </p:sp>
-      <p:sp>
-        <p:nvSpPr>
-          <p:cNvPr id="14" name="TextBox 13"/>
+              <a:t>Margin</a:t>
+            </a:r>
+          </a:p>
+        </p:txBody>
+      </p:sp>
+      <p:sp>
+        <p:nvSpPr>
+          <p:cNvPr id="15" name="TextBox 14"/>
           <p:cNvSpPr txBox="1"/>
           <p:nvPr/>
         </p:nvSpPr>
@@ -7988,14 +8036,14 @@
               </a:defRPr>
             </a:pPr>
             <a:r>
-              <a:t>6200.0</a:t>
-            </a:r>
-          </a:p>
-        </p:txBody>
-      </p:sp>
-      <p:sp>
-        <p:nvSpPr>
-          <p:cNvPr id="15" name="Rectangle 14"/>
+              <a:t>42.1%</a:t>
+            </a:r>
+          </a:p>
+        </p:txBody>
+      </p:sp>
+      <p:sp>
+        <p:nvSpPr>
+          <p:cNvPr id="16" name="Rectangle 15"/>
           <p:cNvSpPr/>
           <p:nvPr/>
         </p:nvSpPr>
@@ -8038,7 +8086,7 @@
       </p:sp>
       <p:sp>
         <p:nvSpPr>
-          <p:cNvPr id="16" name="TextBox 15"/>
+          <p:cNvPr id="17" name="TextBox 16"/>
           <p:cNvSpPr txBox="1"/>
           <p:nvPr/>
         </p:nvSpPr>
@@ -8067,14 +8115,14 @@
               </a:defRPr>
             </a:pPr>
             <a:r>
-              <a:t>Service Revenue</a:t>
-            </a:r>
-          </a:p>
-        </p:txBody>
-      </p:sp>
-      <p:sp>
-        <p:nvSpPr>
-          <p:cNvPr id="17" name="TextBox 16"/>
+              <a:t>Capex/Rev</a:t>
+            </a:r>
+          </a:p>
+        </p:txBody>
+      </p:sp>
+      <p:sp>
+        <p:nvSpPr>
+          <p:cNvPr id="18" name="TextBox 17"/>
           <p:cNvSpPr txBox="1"/>
           <p:nvPr/>
         </p:nvSpPr>
@@ -8103,14 +8151,14 @@
               </a:defRPr>
             </a:pPr>
             <a:r>
-              <a:t>5460.0</a:t>
-            </a:r>
-          </a:p>
-        </p:txBody>
-      </p:sp>
-      <p:sp>
-        <p:nvSpPr>
-          <p:cNvPr id="18" name="TextBox 17"/>
+              <a:t>19.4%</a:t>
+            </a:r>
+          </a:p>
+        </p:txBody>
+      </p:sp>
+      <p:sp>
+        <p:nvSpPr>
+          <p:cNvPr id="19" name="TextBox 18"/>
           <p:cNvSpPr txBox="1"/>
           <p:nvPr/>
         </p:nvSpPr>
@@ -8146,7 +8194,7 @@
       </p:sp>
       <p:sp>
         <p:nvSpPr>
-          <p:cNvPr id="19" name="TextBox 18"/>
+          <p:cNvPr id="20" name="TextBox 19"/>
           <p:cNvSpPr txBox="1"/>
           <p:nvPr/>
         </p:nvSpPr>
@@ -8229,27 +8277,11 @@
               <a:t>• Digital Services: 85.0/100</a:t>
             </a:r>
           </a:p>
-          <a:p>
-            <a:pPr>
-              <a:spcAft>
-                <a:spcPts val="400"/>
-              </a:spcAft>
-              <a:defRPr sz="1100">
-                <a:solidFill>
-                  <a:srgbClr val="333333"/>
-                </a:solidFill>
-                <a:latin typeface="Arial"/>
-              </a:defRPr>
-            </a:pPr>
-            <a:r>
-              <a:t>• Enterprise Solutions: 92.0/100</a:t>
-            </a:r>
-          </a:p>
-        </p:txBody>
-      </p:sp>
-      <p:sp>
-        <p:nvSpPr>
-          <p:cNvPr id="20" name="TextBox 19"/>
+        </p:txBody>
+      </p:sp>
+      <p:sp>
+        <p:nvSpPr>
+          <p:cNvPr id="21" name="TextBox 20"/>
           <p:cNvSpPr txBox="1"/>
           <p:nvPr/>
         </p:nvSpPr>
@@ -8285,7 +8317,7 @@
       </p:sp>
       <p:sp>
         <p:nvSpPr>
-          <p:cNvPr id="21" name="TextBox 20"/>
+          <p:cNvPr id="22" name="TextBox 21"/>
           <p:cNvSpPr txBox="1"/>
           <p:nvPr/>
         </p:nvSpPr>
@@ -8309,7 +8341,7 @@
       </p:sp>
       <p:sp>
         <p:nvSpPr>
-          <p:cNvPr id="22" name="Rectangle 21"/>
+          <p:cNvPr id="23" name="Rectangle 22"/>
           <p:cNvSpPr/>
           <p:nvPr/>
         </p:nvSpPr>
@@ -8352,7 +8384,7 @@
       </p:sp>
       <p:sp>
         <p:nvSpPr>
-          <p:cNvPr id="23" name="TextBox 22"/>
+          <p:cNvPr id="24" name="TextBox 23"/>
           <p:cNvSpPr txBox="1"/>
           <p:nvPr/>
         </p:nvSpPr>
@@ -8381,7 +8413,7 @@
               </a:defRPr>
             </a:pPr>
             <a:r>
-              <a:t>Key Message: Competitor analysis: deutsche_telekom</a:t>
+              <a:t>Key Message: Competitor analysis: Deutsche Telekom</a:t>
             </a:r>
           </a:p>
         </p:txBody>
@@ -8514,7 +8546,7 @@
               </a:defRPr>
             </a:pPr>
             <a:r>
-              <a:t>竞争对手分析</a:t>
+              <a:t>COMPETITOR DEEP DIVE</a:t>
             </a:r>
           </a:p>
         </p:txBody>
@@ -8629,7 +8661,7 @@
               </a:defRPr>
             </a:pPr>
             <a:r>
-              <a:t>Status</a:t>
+              <a:t>Revenue</a:t>
             </a:r>
           </a:p>
         </p:txBody>
@@ -8665,14 +8697,50 @@
               </a:defRPr>
             </a:pPr>
             <a:r>
-              <a:t>data_available</a:t>
-            </a:r>
-          </a:p>
-        </p:txBody>
-      </p:sp>
-      <p:sp>
-        <p:nvSpPr>
-          <p:cNvPr id="9" name="Rectangle 8"/>
+              <a:t>€1,035M</a:t>
+            </a:r>
+          </a:p>
+        </p:txBody>
+      </p:sp>
+      <p:sp>
+        <p:nvSpPr>
+          <p:cNvPr id="9" name="TextBox 8"/>
+          <p:cNvSpPr txBox="1"/>
+          <p:nvPr/>
+        </p:nvSpPr>
+        <p:spPr>
+          <a:xfrm>
+            <a:off x="594360" y="2057400"/>
+            <a:ext cx="2286000" cy="228600"/>
+          </a:xfrm>
+          <a:prstGeom prst="rect">
+            <a:avLst/>
+          </a:prstGeom>
+          <a:noFill/>
+        </p:spPr>
+        <p:txBody>
+          <a:bodyPr wrap="square">
+            <a:spAutoFit/>
+          </a:bodyPr>
+          <a:lstStyle/>
+          <a:p>
+            <a:pPr algn="l">
+              <a:defRPr sz="1000" b="0">
+                <a:solidFill>
+                  <a:srgbClr val="008000"/>
+                </a:solidFill>
+                <a:latin typeface="Arial"/>
+              </a:defRPr>
+            </a:pPr>
+            <a:r>
+              <a:t>+0.1% YoY</a:t>
+            </a:r>
+          </a:p>
+        </p:txBody>
+      </p:sp>
+      <p:sp>
+        <p:nvSpPr>
+          <p:cNvPr id="10" name="Rectangle 9"/>
           <p:cNvSpPr/>
           <p:nvPr/>
         </p:nvSpPr>
@@ -8715,7 +8783,7 @@
       </p:sp>
       <p:sp>
         <p:nvSpPr>
-          <p:cNvPr id="10" name="TextBox 9"/>
+          <p:cNvPr id="11" name="TextBox 10"/>
           <p:cNvSpPr txBox="1"/>
           <p:nvPr/>
         </p:nvSpPr>
@@ -8744,14 +8812,14 @@
               </a:defRPr>
             </a:pPr>
             <a:r>
-              <a:t>Latest Quarter</a:t>
-            </a:r>
-          </a:p>
-        </p:txBody>
-      </p:sp>
-      <p:sp>
-        <p:nvSpPr>
-          <p:cNvPr id="11" name="TextBox 10"/>
+              <a:t>EBITDA</a:t>
+            </a:r>
+          </a:p>
+        </p:txBody>
+      </p:sp>
+      <p:sp>
+        <p:nvSpPr>
+          <p:cNvPr id="12" name="TextBox 11"/>
           <p:cNvSpPr txBox="1"/>
           <p:nvPr/>
         </p:nvSpPr>
@@ -8780,14 +8848,14 @@
               </a:defRPr>
             </a:pPr>
             <a:r>
-              <a:t>CQ4_2025</a:t>
-            </a:r>
-          </a:p>
-        </p:txBody>
-      </p:sp>
-      <p:sp>
-        <p:nvSpPr>
-          <p:cNvPr id="12" name="Rectangle 11"/>
+              <a:t>€126M</a:t>
+            </a:r>
+          </a:p>
+        </p:txBody>
+      </p:sp>
+      <p:sp>
+        <p:nvSpPr>
+          <p:cNvPr id="13" name="Rectangle 12"/>
           <p:cNvSpPr/>
           <p:nvPr/>
         </p:nvSpPr>
@@ -8830,7 +8898,7 @@
       </p:sp>
       <p:sp>
         <p:nvSpPr>
-          <p:cNvPr id="13" name="TextBox 12"/>
+          <p:cNvPr id="14" name="TextBox 13"/>
           <p:cNvSpPr txBox="1"/>
           <p:nvPr/>
         </p:nvSpPr>
@@ -8859,14 +8927,14 @@
               </a:defRPr>
             </a:pPr>
             <a:r>
-              <a:t>Revenue</a:t>
-            </a:r>
-          </a:p>
-        </p:txBody>
-      </p:sp>
-      <p:sp>
-        <p:nvSpPr>
-          <p:cNvPr id="14" name="TextBox 13"/>
+              <a:t>Margin</a:t>
+            </a:r>
+          </a:p>
+        </p:txBody>
+      </p:sp>
+      <p:sp>
+        <p:nvSpPr>
+          <p:cNvPr id="15" name="TextBox 14"/>
           <p:cNvSpPr txBox="1"/>
           <p:nvPr/>
         </p:nvSpPr>
@@ -8895,14 +8963,14 @@
               </a:defRPr>
             </a:pPr>
             <a:r>
-              <a:t>1035.0</a:t>
-            </a:r>
-          </a:p>
-        </p:txBody>
-      </p:sp>
-      <p:sp>
-        <p:nvSpPr>
-          <p:cNvPr id="15" name="Rectangle 14"/>
+              <a:t>12.2%</a:t>
+            </a:r>
+          </a:p>
+        </p:txBody>
+      </p:sp>
+      <p:sp>
+        <p:nvSpPr>
+          <p:cNvPr id="16" name="Rectangle 15"/>
           <p:cNvSpPr/>
           <p:nvPr/>
         </p:nvSpPr>
@@ -8945,7 +9013,7 @@
       </p:sp>
       <p:sp>
         <p:nvSpPr>
-          <p:cNvPr id="16" name="TextBox 15"/>
+          <p:cNvPr id="17" name="TextBox 16"/>
           <p:cNvSpPr txBox="1"/>
           <p:nvPr/>
         </p:nvSpPr>
@@ -8974,14 +9042,14 @@
               </a:defRPr>
             </a:pPr>
             <a:r>
-              <a:t>Service Revenue</a:t>
-            </a:r>
-          </a:p>
-        </p:txBody>
-      </p:sp>
-      <p:sp>
-        <p:nvSpPr>
-          <p:cNvPr id="17" name="TextBox 16"/>
+              <a:t>Capex/Rev</a:t>
+            </a:r>
+          </a:p>
+        </p:txBody>
+      </p:sp>
+      <p:sp>
+        <p:nvSpPr>
+          <p:cNvPr id="18" name="TextBox 17"/>
           <p:cNvSpPr txBox="1"/>
           <p:nvPr/>
         </p:nvSpPr>
@@ -9010,14 +9078,14 @@
               </a:defRPr>
             </a:pPr>
             <a:r>
-              <a:t>915.0</a:t>
-            </a:r>
-          </a:p>
-        </p:txBody>
-      </p:sp>
-      <p:sp>
-        <p:nvSpPr>
-          <p:cNvPr id="18" name="TextBox 17"/>
+              <a:t>38.6%</a:t>
+            </a:r>
+          </a:p>
+        </p:txBody>
+      </p:sp>
+      <p:sp>
+        <p:nvSpPr>
+          <p:cNvPr id="19" name="TextBox 18"/>
           <p:cNvSpPr txBox="1"/>
           <p:nvPr/>
         </p:nvSpPr>
@@ -9053,7 +9121,7 @@
       </p:sp>
       <p:sp>
         <p:nvSpPr>
-          <p:cNvPr id="19" name="TextBox 18"/>
+          <p:cNvPr id="20" name="TextBox 19"/>
           <p:cNvSpPr txBox="1"/>
           <p:nvPr/>
         </p:nvSpPr>
@@ -9124,7 +9192,7 @@
       </p:sp>
       <p:sp>
         <p:nvSpPr>
-          <p:cNvPr id="20" name="TextBox 19"/>
+          <p:cNvPr id="21" name="TextBox 20"/>
           <p:cNvSpPr txBox="1"/>
           <p:nvPr/>
         </p:nvSpPr>
@@ -9160,7 +9228,7 @@
       </p:sp>
       <p:sp>
         <p:nvSpPr>
-          <p:cNvPr id="21" name="TextBox 20"/>
+          <p:cNvPr id="22" name="TextBox 21"/>
           <p:cNvSpPr txBox="1"/>
           <p:nvPr/>
         </p:nvSpPr>
@@ -9184,7 +9252,7 @@
       </p:sp>
       <p:sp>
         <p:nvSpPr>
-          <p:cNvPr id="22" name="Rectangle 21"/>
+          <p:cNvPr id="23" name="Rectangle 22"/>
           <p:cNvSpPr/>
           <p:nvPr/>
         </p:nvSpPr>
@@ -9227,7 +9295,7 @@
       </p:sp>
       <p:sp>
         <p:nvSpPr>
-          <p:cNvPr id="23" name="TextBox 22"/>
+          <p:cNvPr id="24" name="TextBox 23"/>
           <p:cNvSpPr txBox="1"/>
           <p:nvPr/>
         </p:nvSpPr>
@@ -9256,7 +9324,7 @@
               </a:defRPr>
             </a:pPr>
             <a:r>
-              <a:t>Key Message: Competitor analysis: one_and_one</a:t>
+              <a:t>Key Message: Competitor analysis: One And One</a:t>
             </a:r>
           </a:p>
         </p:txBody>
@@ -9389,7 +9457,7 @@
               </a:defRPr>
             </a:pPr>
             <a:r>
-              <a:t>竞争格局总结</a:t>
+              <a:t>COMPETITION</a:t>
             </a:r>
           </a:p>
         </p:txBody>
@@ -9661,7 +9729,7 @@
               </a:defRPr>
             </a:pPr>
             <a:r>
-              <a:t>目录</a:t>
+              <a:t>TABLE OF CONTENTS</a:t>
             </a:r>
           </a:p>
         </p:txBody>
@@ -9963,7 +10031,7 @@
               </a:defRPr>
             </a:pPr>
             <a:r>
-              <a:t>看趋势 Trends</a:t>
+              <a:t>Look at Trends</a:t>
             </a:r>
           </a:p>
         </p:txBody>
@@ -10114,7 +10182,7 @@
               </a:defRPr>
             </a:pPr>
             <a:r>
-              <a:t>看市场 Market/Customer</a:t>
+              <a:t>Look at Market</a:t>
             </a:r>
           </a:p>
         </p:txBody>
@@ -10150,7 +10218,7 @@
               </a:defRPr>
             </a:pPr>
             <a:r>
-              <a:t>$APPEALS — market changes &amp; needs</a:t>
+              <a:t>$APPEALS — market changes &amp; customer needs</a:t>
             </a:r>
           </a:p>
         </p:txBody>
@@ -10265,7 +10333,7 @@
               </a:defRPr>
             </a:pPr>
             <a:r>
-              <a:t>看竞争 Competition</a:t>
+              <a:t>Look at Competition</a:t>
             </a:r>
           </a:p>
         </p:txBody>
@@ -10416,7 +10484,7 @@
               </a:defRPr>
             </a:pPr>
             <a:r>
-              <a:t>看自己 Self</a:t>
+              <a:t>Look at Self</a:t>
             </a:r>
           </a:p>
         </p:txBody>
@@ -10718,7 +10786,7 @@
               </a:defRPr>
             </a:pPr>
             <a:r>
-              <a:t>看机会 Opportunities</a:t>
+              <a:t>Look at Opportunities</a:t>
             </a:r>
           </a:p>
         </p:txBody>
@@ -11038,7 +11106,7 @@
               </a:defRPr>
             </a:pPr>
             <a:r>
-              <a:t>新进入者威胁</a:t>
+              <a:t>MARKET ENTRY</a:t>
             </a:r>
           </a:p>
         </p:txBody>
@@ -11129,7 +11197,7 @@
               </a:defRPr>
             </a:pPr>
             <a:r>
-              <a:t>• 1&amp;1 completes OpenRAN migration, reaches 25% own network coverage: 1&amp;1全部移动用户已迁移至自有OpenRAN 5G网络（欧洲首个）。自有基站约1,500个运营中，约4,500个在建。达到25%人口覆盖的监管截止日目标。Q3 2025移动净增+4万（H1因迁移影响基本持平）。9个月CAPEX €2.287亿主要用于建网。</a:t>
+              <a:t>• 1&amp;1 completes OpenRAN migration, reaches 25% own network coverage: 1&amp;1OpenRAN 5G1,5004,50025%Q3 2025+4H19CAPEX €2.287</a:t>
             </a:r>
           </a:p>
           <a:p>
@@ -11321,7 +11389,7 @@
               </a:defRPr>
             </a:pPr>
             <a:r>
-              <a:t>04 看自己</a:t>
+              <a:t>04 Look at Self</a:t>
             </a:r>
           </a:p>
         </p:txBody>
@@ -11357,7 +11425,7 @@
               </a:defRPr>
             </a:pPr>
             <a:r>
-              <a:t>Look at Self — BMC + Capability</a:t>
+              <a:t>BMC + Capability Assessment</a:t>
             </a:r>
           </a:p>
         </p:txBody>
@@ -11490,7 +11558,7 @@
               </a:defRPr>
             </a:pPr>
             <a:r>
-              <a:t>经营体检</a:t>
+              <a:t>FINANCIAL HEALTH</a:t>
             </a:r>
           </a:p>
         </p:txBody>
@@ -11605,7 +11673,7 @@
               </a:defRPr>
             </a:pPr>
             <a:r>
-              <a:t>Total Revenue</a:t>
+              <a:t>Revenue</a:t>
             </a:r>
           </a:p>
         </p:txBody>
@@ -11641,14 +11709,50 @@
               </a:defRPr>
             </a:pPr>
             <a:r>
-              <a:t>3092.0</a:t>
-            </a:r>
-          </a:p>
-        </p:txBody>
-      </p:sp>
-      <p:sp>
-        <p:nvSpPr>
-          <p:cNvPr id="9" name="Rectangle 8"/>
+              <a:t>€3,092M</a:t>
+            </a:r>
+          </a:p>
+        </p:txBody>
+      </p:sp>
+      <p:sp>
+        <p:nvSpPr>
+          <p:cNvPr id="9" name="TextBox 8"/>
+          <p:cNvSpPr txBox="1"/>
+          <p:nvPr/>
+        </p:nvSpPr>
+        <p:spPr>
+          <a:xfrm>
+            <a:off x="594360" y="2057400"/>
+            <a:ext cx="2286000" cy="228600"/>
+          </a:xfrm>
+          <a:prstGeom prst="rect">
+            <a:avLst/>
+          </a:prstGeom>
+          <a:noFill/>
+        </p:spPr>
+        <p:txBody>
+          <a:bodyPr wrap="square">
+            <a:spAutoFit/>
+          </a:bodyPr>
+          <a:lstStyle/>
+          <a:p>
+            <a:pPr algn="l">
+              <a:defRPr sz="1000" b="0">
+                <a:solidFill>
+                  <a:srgbClr val="008000"/>
+                </a:solidFill>
+                <a:latin typeface="Arial"/>
+              </a:defRPr>
+            </a:pPr>
+            <a:r>
+              <a:t>+0.72% YoY</a:t>
+            </a:r>
+          </a:p>
+        </p:txBody>
+      </p:sp>
+      <p:sp>
+        <p:nvSpPr>
+          <p:cNvPr id="10" name="Rectangle 9"/>
           <p:cNvSpPr/>
           <p:nvPr/>
         </p:nvSpPr>
@@ -11691,7 +11795,7 @@
       </p:sp>
       <p:sp>
         <p:nvSpPr>
-          <p:cNvPr id="10" name="TextBox 9"/>
+          <p:cNvPr id="11" name="TextBox 10"/>
           <p:cNvSpPr txBox="1"/>
           <p:nvPr/>
         </p:nvSpPr>
@@ -11720,14 +11824,14 @@
               </a:defRPr>
             </a:pPr>
             <a:r>
-              <a:t>Service Revenue</a:t>
-            </a:r>
-          </a:p>
-        </p:txBody>
-      </p:sp>
-      <p:sp>
-        <p:nvSpPr>
-          <p:cNvPr id="11" name="TextBox 10"/>
+              <a:t>EBITDA</a:t>
+            </a:r>
+          </a:p>
+        </p:txBody>
+      </p:sp>
+      <p:sp>
+        <p:nvSpPr>
+          <p:cNvPr id="12" name="TextBox 11"/>
           <p:cNvSpPr txBox="1"/>
           <p:nvPr/>
         </p:nvSpPr>
@@ -11756,14 +11860,50 @@
               </a:defRPr>
             </a:pPr>
             <a:r>
-              <a:t>2726.0</a:t>
-            </a:r>
-          </a:p>
-        </p:txBody>
-      </p:sp>
-      <p:sp>
-        <p:nvSpPr>
-          <p:cNvPr id="12" name="Rectangle 11"/>
+              <a:t>€1,120M</a:t>
+            </a:r>
+          </a:p>
+        </p:txBody>
+      </p:sp>
+      <p:sp>
+        <p:nvSpPr>
+          <p:cNvPr id="13" name="TextBox 12"/>
+          <p:cNvSpPr txBox="1"/>
+          <p:nvPr/>
+        </p:nvSpPr>
+        <p:spPr>
+          <a:xfrm>
+            <a:off x="3337560" y="2057400"/>
+            <a:ext cx="2286000" cy="228600"/>
+          </a:xfrm>
+          <a:prstGeom prst="rect">
+            <a:avLst/>
+          </a:prstGeom>
+          <a:noFill/>
+        </p:spPr>
+        <p:txBody>
+          <a:bodyPr wrap="square">
+            <a:spAutoFit/>
+          </a:bodyPr>
+          <a:lstStyle/>
+          <a:p>
+            <a:pPr algn="l">
+              <a:defRPr sz="1000" b="0">
+                <a:solidFill>
+                  <a:srgbClr val="008000"/>
+                </a:solidFill>
+                <a:latin typeface="Arial"/>
+              </a:defRPr>
+            </a:pPr>
+            <a:r>
+              <a:t>+1.5% YoY</a:t>
+            </a:r>
+          </a:p>
+        </p:txBody>
+      </p:sp>
+      <p:sp>
+        <p:nvSpPr>
+          <p:cNvPr id="14" name="Rectangle 13"/>
           <p:cNvSpPr/>
           <p:nvPr/>
         </p:nvSpPr>
@@ -11806,7 +11946,7 @@
       </p:sp>
       <p:sp>
         <p:nvSpPr>
-          <p:cNvPr id="13" name="TextBox 12"/>
+          <p:cNvPr id="15" name="TextBox 14"/>
           <p:cNvSpPr txBox="1"/>
           <p:nvPr/>
         </p:nvSpPr>
@@ -11835,14 +11975,14 @@
               </a:defRPr>
             </a:pPr>
             <a:r>
-              <a:t>Ebitda</a:t>
-            </a:r>
-          </a:p>
-        </p:txBody>
-      </p:sp>
-      <p:sp>
-        <p:nvSpPr>
-          <p:cNvPr id="14" name="TextBox 13"/>
+              <a:t>EBITDA Margin</a:t>
+            </a:r>
+          </a:p>
+        </p:txBody>
+      </p:sp>
+      <p:sp>
+        <p:nvSpPr>
+          <p:cNvPr id="16" name="TextBox 15"/>
           <p:cNvSpPr txBox="1"/>
           <p:nvPr/>
         </p:nvSpPr>
@@ -11871,14 +12011,14 @@
               </a:defRPr>
             </a:pPr>
             <a:r>
-              <a:t>1120.0</a:t>
-            </a:r>
-          </a:p>
-        </p:txBody>
-      </p:sp>
-      <p:sp>
-        <p:nvSpPr>
-          <p:cNvPr id="15" name="Rectangle 14"/>
+              <a:t>36.2%</a:t>
+            </a:r>
+          </a:p>
+        </p:txBody>
+      </p:sp>
+      <p:sp>
+        <p:nvSpPr>
+          <p:cNvPr id="17" name="Rectangle 16"/>
           <p:cNvSpPr/>
           <p:nvPr/>
         </p:nvSpPr>
@@ -11921,7 +12061,7 @@
       </p:sp>
       <p:sp>
         <p:nvSpPr>
-          <p:cNvPr id="16" name="TextBox 15"/>
+          <p:cNvPr id="18" name="TextBox 17"/>
           <p:cNvSpPr txBox="1"/>
           <p:nvPr/>
         </p:nvSpPr>
@@ -11950,14 +12090,14 @@
               </a:defRPr>
             </a:pPr>
             <a:r>
-              <a:t>Ebitda Margin Pct</a:t>
-            </a:r>
-          </a:p>
-        </p:txBody>
-      </p:sp>
-      <p:sp>
-        <p:nvSpPr>
-          <p:cNvPr id="17" name="TextBox 16"/>
+              <a:t>Capex/Rev</a:t>
+            </a:r>
+          </a:p>
+        </p:txBody>
+      </p:sp>
+      <p:sp>
+        <p:nvSpPr>
+          <p:cNvPr id="19" name="TextBox 18"/>
           <p:cNvSpPr txBox="1"/>
           <p:nvPr/>
         </p:nvSpPr>
@@ -11986,360 +12126,62 @@
               </a:defRPr>
             </a:pPr>
             <a:r>
-              <a:t>36.2</a:t>
-            </a:r>
-          </a:p>
-        </p:txBody>
-      </p:sp>
-      <p:sp>
-        <p:nvSpPr>
-          <p:cNvPr id="18" name="TextBox 17"/>
-          <p:cNvSpPr txBox="1"/>
-          <p:nvPr/>
-        </p:nvSpPr>
-        <p:spPr>
-          <a:xfrm>
-            <a:off x="457200" y="2743200"/>
-            <a:ext cx="2743200" cy="365760"/>
-          </a:xfrm>
-          <a:prstGeom prst="rect">
-            <a:avLst/>
-          </a:prstGeom>
-          <a:noFill/>
-        </p:spPr>
-        <p:txBody>
-          <a:bodyPr wrap="square">
-            <a:spAutoFit/>
-          </a:bodyPr>
-          <a:lstStyle/>
-          <a:p>
-            <a:pPr algn="l">
-              <a:defRPr sz="1400" b="1">
-                <a:solidFill>
-                  <a:srgbClr val="FFA500"/>
-                </a:solidFill>
-                <a:latin typeface="Arial"/>
-              </a:defRPr>
-            </a:pPr>
-            <a:r>
-              <a:t>Health Rating: STABLE</a:t>
-            </a:r>
-          </a:p>
-        </p:txBody>
-      </p:sp>
-      <p:sp>
-        <p:nvSpPr>
-          <p:cNvPr id="19" name="TextBox 18"/>
-          <p:cNvSpPr txBox="1"/>
-          <p:nvPr/>
-        </p:nvSpPr>
-        <p:spPr>
-          <a:xfrm>
-            <a:off x="457200" y="3291840"/>
-            <a:ext cx="4572000" cy="274320"/>
-          </a:xfrm>
-          <a:prstGeom prst="rect">
-            <a:avLst/>
-          </a:prstGeom>
-          <a:noFill/>
-        </p:spPr>
-        <p:txBody>
-          <a:bodyPr wrap="square">
-            <a:spAutoFit/>
-          </a:bodyPr>
-          <a:lstStyle/>
-          <a:p>
-            <a:pPr algn="l">
-              <a:defRPr sz="1200" b="1">
-                <a:solidFill>
-                  <a:srgbClr val="E60000"/>
-                </a:solidFill>
-                <a:latin typeface="Arial"/>
-              </a:defRPr>
-            </a:pPr>
-            <a:r>
-              <a:t>Revenue Breakdown:</a:t>
-            </a:r>
-          </a:p>
-        </p:txBody>
-      </p:sp>
-      <p:sp>
-        <p:nvSpPr>
-          <p:cNvPr id="20" name="TextBox 19"/>
-          <p:cNvSpPr txBox="1"/>
-          <p:nvPr/>
-        </p:nvSpPr>
-        <p:spPr>
-          <a:xfrm>
-            <a:off x="457200" y="3566160"/>
-            <a:ext cx="4572000" cy="1828800"/>
-          </a:xfrm>
-          <a:prstGeom prst="rect">
-            <a:avLst/>
-          </a:prstGeom>
-          <a:noFill/>
-        </p:spPr>
-        <p:txBody>
-          <a:bodyPr wrap="square">
-            <a:spAutoFit/>
-          </a:bodyPr>
-          <a:lstStyle/>
-          <a:p>
-            <a:pPr>
-              <a:spcAft>
-                <a:spcPts val="400"/>
-              </a:spcAft>
-              <a:defRPr sz="1100">
-                <a:solidFill>
-                  <a:srgbClr val="333333"/>
-                </a:solidFill>
-                <a:latin typeface="Arial"/>
-              </a:defRPr>
-            </a:pPr>
-            <a:r>
-              <a:t>• Mobile Service Revenue: €1,520M (49.2%)</a:t>
-            </a:r>
-          </a:p>
-          <a:p>
-            <a:pPr>
-              <a:spcAft>
-                <a:spcPts val="400"/>
-              </a:spcAft>
-              <a:defRPr sz="1100">
-                <a:solidFill>
-                  <a:srgbClr val="333333"/>
-                </a:solidFill>
-                <a:latin typeface="Arial"/>
-              </a:defRPr>
-            </a:pPr>
-            <a:r>
-              <a:t>• Fixed Service Revenue: €795M (25.7%)</a:t>
-            </a:r>
-          </a:p>
-          <a:p>
-            <a:pPr>
-              <a:spcAft>
-                <a:spcPts val="400"/>
-              </a:spcAft>
-              <a:defRPr sz="1100">
-                <a:solidFill>
-                  <a:srgbClr val="333333"/>
-                </a:solidFill>
-                <a:latin typeface="Arial"/>
-              </a:defRPr>
-            </a:pPr>
-            <a:r>
-              <a:t>• B2B Revenue: €520M (16.8%)</a:t>
-            </a:r>
-          </a:p>
-          <a:p>
-            <a:pPr>
-              <a:spcAft>
-                <a:spcPts val="400"/>
-              </a:spcAft>
-              <a:defRPr sz="1100">
-                <a:solidFill>
-                  <a:srgbClr val="333333"/>
-                </a:solidFill>
-                <a:latin typeface="Arial"/>
-              </a:defRPr>
-            </a:pPr>
-            <a:r>
-              <a:t>• Tv Revenue: €268M (8.7%)</a:t>
-            </a:r>
-          </a:p>
-          <a:p>
-            <a:pPr>
-              <a:spcAft>
-                <a:spcPts val="400"/>
-              </a:spcAft>
-              <a:defRPr sz="1100">
-                <a:solidFill>
-                  <a:srgbClr val="333333"/>
-                </a:solidFill>
-                <a:latin typeface="Arial"/>
-              </a:defRPr>
-            </a:pPr>
-            <a:r>
-              <a:t>• Wholesale Revenue: €380M (12.3%)</a:t>
-            </a:r>
-          </a:p>
-          <a:p>
-            <a:pPr>
-              <a:spcAft>
-                <a:spcPts val="400"/>
-              </a:spcAft>
-              <a:defRPr sz="1100">
-                <a:solidFill>
-                  <a:srgbClr val="333333"/>
-                </a:solidFill>
-                <a:latin typeface="Arial"/>
-              </a:defRPr>
-            </a:pPr>
-            <a:r>
-              <a:t>• Total Revenue: 3092.0</a:t>
-            </a:r>
-          </a:p>
-        </p:txBody>
-      </p:sp>
-      <p:sp>
-        <p:nvSpPr>
-          <p:cNvPr id="21" name="TextBox 20"/>
-          <p:cNvSpPr txBox="1"/>
-          <p:nvPr/>
-        </p:nvSpPr>
-        <p:spPr>
-          <a:xfrm>
-            <a:off x="5943600" y="3291840"/>
-            <a:ext cx="5029200" cy="274320"/>
-          </a:xfrm>
-          <a:prstGeom prst="rect">
-            <a:avLst/>
-          </a:prstGeom>
-          <a:noFill/>
-        </p:spPr>
-        <p:txBody>
-          <a:bodyPr wrap="square">
-            <a:spAutoFit/>
-          </a:bodyPr>
-          <a:lstStyle/>
-          <a:p>
-            <a:pPr algn="l">
-              <a:defRPr sz="1200" b="1">
-                <a:solidFill>
-                  <a:srgbClr val="E60000"/>
-                </a:solidFill>
-                <a:latin typeface="Arial"/>
-              </a:defRPr>
-            </a:pPr>
-            <a:r>
-              <a:t>Market Positions:</a:t>
-            </a:r>
-          </a:p>
-        </p:txBody>
-      </p:sp>
-      <p:sp>
-        <p:nvSpPr>
-          <p:cNvPr id="22" name="TextBox 21"/>
-          <p:cNvSpPr txBox="1"/>
-          <p:nvPr/>
-        </p:nvSpPr>
-        <p:spPr>
-          <a:xfrm>
-            <a:off x="5943600" y="3566160"/>
-            <a:ext cx="5029200" cy="1828800"/>
-          </a:xfrm>
-          <a:prstGeom prst="rect">
-            <a:avLst/>
-          </a:prstGeom>
-          <a:noFill/>
-        </p:spPr>
-        <p:txBody>
-          <a:bodyPr wrap="square">
-            <a:spAutoFit/>
-          </a:bodyPr>
-          <a:lstStyle/>
-          <a:p>
-            <a:pPr>
-              <a:spcAft>
-                <a:spcPts val="400"/>
-              </a:spcAft>
-              <a:defRPr sz="1100">
-                <a:solidFill>
-                  <a:srgbClr val="333333"/>
-                </a:solidFill>
-                <a:latin typeface="Arial"/>
-              </a:defRPr>
-            </a:pPr>
-            <a:r>
-              <a:t>• calendar_quarter: CQ4_2025</a:t>
-            </a:r>
-          </a:p>
-          <a:p>
-            <a:pPr>
-              <a:spcAft>
-                <a:spcPts val="400"/>
-              </a:spcAft>
-              <a:defRPr sz="1100">
-                <a:solidFill>
-                  <a:srgbClr val="333333"/>
-                </a:solidFill>
-                <a:latin typeface="Arial"/>
-              </a:defRPr>
-            </a:pPr>
-            <a:r>
-              <a:t>• operators_count: 4</a:t>
-            </a:r>
-          </a:p>
-          <a:p>
-            <a:pPr>
-              <a:spcAft>
-                <a:spcPts val="400"/>
-              </a:spcAft>
-              <a:defRPr sz="1100">
-                <a:solidFill>
-                  <a:srgbClr val="333333"/>
-                </a:solidFill>
-                <a:latin typeface="Arial"/>
-              </a:defRPr>
-            </a:pPr>
-            <a:r>
-              <a:t>• revenue_rank: 2</a:t>
-            </a:r>
-          </a:p>
-          <a:p>
-            <a:pPr>
-              <a:spcAft>
-                <a:spcPts val="400"/>
-              </a:spcAft>
-              <a:defRPr sz="1100">
-                <a:solidFill>
-                  <a:srgbClr val="333333"/>
-                </a:solidFill>
-                <a:latin typeface="Arial"/>
-              </a:defRPr>
-            </a:pPr>
-            <a:r>
-              <a:t>• total_revenue: 3092.0</a:t>
-            </a:r>
-          </a:p>
-          <a:p>
-            <a:pPr>
-              <a:spcAft>
-                <a:spcPts val="400"/>
-              </a:spcAft>
-              <a:defRPr sz="1100">
-                <a:solidFill>
-                  <a:srgbClr val="333333"/>
-                </a:solidFill>
-                <a:latin typeface="Arial"/>
-              </a:defRPr>
-            </a:pPr>
-            <a:r>
-              <a:t>• revenue_market_share_pct: 25.1</a:t>
-            </a:r>
-          </a:p>
-          <a:p>
-            <a:pPr>
-              <a:spcAft>
-                <a:spcPts val="400"/>
-              </a:spcAft>
-              <a:defRPr sz="1100">
-                <a:solidFill>
-                  <a:srgbClr val="333333"/>
-                </a:solidFill>
-                <a:latin typeface="Arial"/>
-              </a:defRPr>
-            </a:pPr>
-            <a:r>
-              <a:t>• subscriber_rank: 3</a:t>
-            </a:r>
-          </a:p>
-        </p:txBody>
-      </p:sp>
-      <p:sp>
-        <p:nvSpPr>
-          <p:cNvPr id="23" name="Rectangle 22"/>
+              <a:t>25.9%</a:t>
+            </a:r>
+          </a:p>
+        </p:txBody>
+      </p:sp>
+      <p:pic>
+        <p:nvPicPr>
+          <p:cNvPr id="20" name="Picture 19" descr="revenue_trend.png"/>
+          <p:cNvPicPr>
+            <a:picLocks noChangeAspect="1"/>
+          </p:cNvPicPr>
+          <p:nvPr/>
+        </p:nvPicPr>
+        <p:blipFill>
+          <a:blip r:embed="rId2"/>
+          <a:stretch>
+            <a:fillRect/>
+          </a:stretch>
+        </p:blipFill>
+        <p:spPr>
+          <a:xfrm>
+            <a:off x="274320" y="2651760"/>
+            <a:ext cx="5486400" cy="2834640"/>
+          </a:xfrm>
+          <a:prstGeom prst="rect">
+            <a:avLst/>
+          </a:prstGeom>
+        </p:spPr>
+      </p:pic>
+      <p:pic>
+        <p:nvPicPr>
+          <p:cNvPr id="21" name="Picture 20" descr="revenue_breakdown.png"/>
+          <p:cNvPicPr>
+            <a:picLocks noChangeAspect="1"/>
+          </p:cNvPicPr>
+          <p:nvPr/>
+        </p:nvPicPr>
+        <p:blipFill>
+          <a:blip r:embed="rId3"/>
+          <a:stretch>
+            <a:fillRect/>
+          </a:stretch>
+        </p:blipFill>
+        <p:spPr>
+          <a:xfrm>
+            <a:off x="5943600" y="2651760"/>
+            <a:ext cx="5760720" cy="2834640"/>
+          </a:xfrm>
+          <a:prstGeom prst="rect">
+            <a:avLst/>
+          </a:prstGeom>
+        </p:spPr>
+      </p:pic>
+      <p:sp>
+        <p:nvSpPr>
+          <p:cNvPr id="22" name="Rectangle 21"/>
           <p:cNvSpPr/>
           <p:nvPr/>
         </p:nvSpPr>
@@ -12382,7 +12224,7 @@
       </p:sp>
       <p:sp>
         <p:nvSpPr>
-          <p:cNvPr id="24" name="TextBox 23"/>
+          <p:cNvPr id="23" name="TextBox 22"/>
           <p:cNvSpPr txBox="1"/>
           <p:nvPr/>
         </p:nvSpPr>
@@ -12411,7 +12253,7 @@
               </a:defRPr>
             </a:pPr>
             <a:r>
-              <a:t>Key Message: Ranked #2 of 4 operators in market; revenue EUR 3092.0M; EBITDA margin 36.2%; stable but facing challenges; key strength: Brand Strength; key challenge: Customer Service; Management outlook: 德国EBITDA：H2表现优于H1，但FY26不会回到正增长。关键顺风因素：(1) MDU同比基数效应Q3开始消退；(2) 1&amp;1批发收入Q4达到完整运行率(full run-rate)；(3) MVNO基数效应。预计FY27才能真正实现E</a:t>
+              <a:t>Key Message: Ranked #2 of 4 operators in market; revenue EUR 3092.0M; EBITDA margin 36.2%; stable but facing challenges; key strength: Brand Strength; key challenge: Customer Service; Management outlook: EBITDAH2H1FY26(1) MDUQ3(2) 1&amp;1Q4(full run-rate)(3) MVNOFY27E</a:t>
             </a:r>
           </a:p>
         </p:txBody>
@@ -12544,7 +12386,7 @@
               </a:defRPr>
             </a:pPr>
             <a:r>
-              <a:t>细分业务分析</a:t>
+              <a:t>SEGMENT PERFORMANCE</a:t>
             </a:r>
           </a:p>
         </p:txBody>
@@ -12659,7 +12501,7 @@
               </a:defRPr>
             </a:pPr>
             <a:r>
-              <a:t>Mobile Service Revenue</a:t>
+              <a:t>Service Revenue</a:t>
             </a:r>
           </a:p>
         </p:txBody>
@@ -12695,7 +12537,7 @@
               </a:defRPr>
             </a:pPr>
             <a:r>
-              <a:t>1520.0</a:t>
+              <a:t>€1,520M</a:t>
             </a:r>
           </a:p>
         </p:txBody>
@@ -12774,7 +12616,7 @@
               </a:defRPr>
             </a:pPr>
             <a:r>
-              <a:t>Mobile Service Growth Pct</a:t>
+              <a:t>Service Growth Pct</a:t>
             </a:r>
           </a:p>
         </p:txBody>
@@ -12810,7 +12652,7 @@
               </a:defRPr>
             </a:pPr>
             <a:r>
-              <a:t>2.8</a:t>
+              <a:t>2.8%</a:t>
             </a:r>
           </a:p>
         </p:txBody>
@@ -12889,7 +12731,7 @@
               </a:defRPr>
             </a:pPr>
             <a:r>
-              <a:t>Mobile Total K</a:t>
+              <a:t>Total K</a:t>
             </a:r>
           </a:p>
         </p:txBody>
@@ -12925,7 +12767,7 @@
               </a:defRPr>
             </a:pPr>
             <a:r>
-              <a:t>32500.0</a:t>
+              <a:t>€32,500M</a:t>
             </a:r>
           </a:p>
         </p:txBody>
@@ -13004,7 +12846,7 @@
               </a:defRPr>
             </a:pPr>
             <a:r>
-              <a:t>Mobile Postpaid K</a:t>
+              <a:t>Postpaid K</a:t>
             </a:r>
           </a:p>
         </p:txBody>
@@ -13040,14 +12882,38 @@
               </a:defRPr>
             </a:pPr>
             <a:r>
-              <a:t>23200.0</a:t>
-            </a:r>
-          </a:p>
-        </p:txBody>
-      </p:sp>
-      <p:sp>
-        <p:nvSpPr>
-          <p:cNvPr id="18" name="TextBox 17"/>
+              <a:t>€23,200M</a:t>
+            </a:r>
+          </a:p>
+        </p:txBody>
+      </p:sp>
+      <p:pic>
+        <p:nvPicPr>
+          <p:cNvPr id="18" name="Picture 17" descr="segment_0_metrics.png"/>
+          <p:cNvPicPr>
+            <a:picLocks noChangeAspect="1"/>
+          </p:cNvPicPr>
+          <p:nvPr/>
+        </p:nvPicPr>
+        <p:blipFill>
+          <a:blip r:embed="rId2"/>
+          <a:stretch>
+            <a:fillRect/>
+          </a:stretch>
+        </p:blipFill>
+        <p:spPr>
+          <a:xfrm>
+            <a:off x="5943600" y="2560320"/>
+            <a:ext cx="5486400" cy="2926080"/>
+          </a:xfrm>
+          <a:prstGeom prst="rect">
+            <a:avLst/>
+          </a:prstGeom>
+        </p:spPr>
+      </p:pic>
+      <p:sp>
+        <p:nvSpPr>
+          <p:cNvPr id="19" name="TextBox 18"/>
           <p:cNvSpPr txBox="1"/>
           <p:nvPr/>
         </p:nvSpPr>
@@ -13083,14 +12949,14 @@
       </p:sp>
       <p:sp>
         <p:nvSpPr>
-          <p:cNvPr id="19" name="TextBox 18"/>
+          <p:cNvPr id="20" name="TextBox 19"/>
           <p:cNvSpPr txBox="1"/>
           <p:nvPr/>
         </p:nvSpPr>
         <p:spPr>
           <a:xfrm>
             <a:off x="457200" y="2926080"/>
-            <a:ext cx="5029200" cy="1828800"/>
+            <a:ext cx="5029200" cy="2286000"/>
           </a:xfrm>
           <a:prstGeom prst="rect">
             <a:avLst/>
@@ -13154,7 +13020,7 @@
       </p:sp>
       <p:sp>
         <p:nvSpPr>
-          <p:cNvPr id="20" name="Rectangle 19"/>
+          <p:cNvPr id="21" name="Rectangle 20"/>
           <p:cNvSpPr/>
           <p:nvPr/>
         </p:nvSpPr>
@@ -13197,7 +13063,7 @@
       </p:sp>
       <p:sp>
         <p:nvSpPr>
-          <p:cNvPr id="21" name="TextBox 20"/>
+          <p:cNvPr id="22" name="TextBox 21"/>
           <p:cNvSpPr txBox="1"/>
           <p:nvPr/>
         </p:nvSpPr>
@@ -13359,7 +13225,7 @@
               </a:defRPr>
             </a:pPr>
             <a:r>
-              <a:t>细分业务分析</a:t>
+              <a:t>SEGMENT PERFORMANCE</a:t>
             </a:r>
           </a:p>
         </p:txBody>
@@ -13474,7 +13340,7 @@
               </a:defRPr>
             </a:pPr>
             <a:r>
-              <a:t>Fixed Service Revenue</a:t>
+              <a:t>Service Revenue</a:t>
             </a:r>
           </a:p>
         </p:txBody>
@@ -13510,7 +13376,7 @@
               </a:defRPr>
             </a:pPr>
             <a:r>
-              <a:t>795.0</a:t>
+              <a:t>€795M</a:t>
             </a:r>
           </a:p>
         </p:txBody>
@@ -13589,7 +13455,7 @@
               </a:defRPr>
             </a:pPr>
             <a:r>
-              <a:t>Fixed Service Growth Pct</a:t>
+              <a:t>Service Growth Pct</a:t>
             </a:r>
           </a:p>
         </p:txBody>
@@ -13625,7 +13491,7 @@
               </a:defRPr>
             </a:pPr>
             <a:r>
-              <a:t>-1.1</a:t>
+              <a:t>-1.1%</a:t>
             </a:r>
           </a:p>
         </p:txBody>
@@ -13704,7 +13570,7 @@
               </a:defRPr>
             </a:pPr>
             <a:r>
-              <a:t>Broadband Total K</a:t>
+              <a:t>Total K</a:t>
             </a:r>
           </a:p>
         </p:txBody>
@@ -13740,7 +13606,7 @@
               </a:defRPr>
             </a:pPr>
             <a:r>
-              <a:t>9940.0</a:t>
+              <a:t>€9,940M</a:t>
             </a:r>
           </a:p>
         </p:txBody>
@@ -13819,7 +13685,7 @@
               </a:defRPr>
             </a:pPr>
             <a:r>
-              <a:t>Broadband Net Adds K</a:t>
+              <a:t>Net Adds K</a:t>
             </a:r>
           </a:p>
         </p:txBody>
@@ -13855,14 +13721,38 @@
               </a:defRPr>
             </a:pPr>
             <a:r>
-              <a:t>-63.0</a:t>
-            </a:r>
-          </a:p>
-        </p:txBody>
-      </p:sp>
-      <p:sp>
-        <p:nvSpPr>
-          <p:cNvPr id="18" name="TextBox 17"/>
+              <a:t>-63</a:t>
+            </a:r>
+          </a:p>
+        </p:txBody>
+      </p:sp>
+      <p:pic>
+        <p:nvPicPr>
+          <p:cNvPr id="18" name="Picture 17" descr="segment_1_metrics.png"/>
+          <p:cNvPicPr>
+            <a:picLocks noChangeAspect="1"/>
+          </p:cNvPicPr>
+          <p:nvPr/>
+        </p:nvPicPr>
+        <p:blipFill>
+          <a:blip r:embed="rId2"/>
+          <a:stretch>
+            <a:fillRect/>
+          </a:stretch>
+        </p:blipFill>
+        <p:spPr>
+          <a:xfrm>
+            <a:off x="5943600" y="2560320"/>
+            <a:ext cx="5486400" cy="2926080"/>
+          </a:xfrm>
+          <a:prstGeom prst="rect">
+            <a:avLst/>
+          </a:prstGeom>
+        </p:spPr>
+      </p:pic>
+      <p:sp>
+        <p:nvSpPr>
+          <p:cNvPr id="19" name="TextBox 18"/>
           <p:cNvSpPr txBox="1"/>
           <p:nvPr/>
         </p:nvSpPr>
@@ -13898,14 +13788,14 @@
       </p:sp>
       <p:sp>
         <p:nvSpPr>
-          <p:cNvPr id="19" name="TextBox 18"/>
+          <p:cNvPr id="20" name="TextBox 19"/>
           <p:cNvSpPr txBox="1"/>
           <p:nvPr/>
         </p:nvSpPr>
         <p:spPr>
           <a:xfrm>
             <a:off x="457200" y="2926080"/>
-            <a:ext cx="5029200" cy="1828800"/>
+            <a:ext cx="5029200" cy="2286000"/>
           </a:xfrm>
           <a:prstGeom prst="rect">
             <a:avLst/>
@@ -13969,7 +13859,7 @@
       </p:sp>
       <p:sp>
         <p:nvSpPr>
-          <p:cNvPr id="20" name="Rectangle 19"/>
+          <p:cNvPr id="21" name="Rectangle 20"/>
           <p:cNvSpPr/>
           <p:nvPr/>
         </p:nvSpPr>
@@ -14012,7 +13902,7 @@
       </p:sp>
       <p:sp>
         <p:nvSpPr>
-          <p:cNvPr id="21" name="TextBox 20"/>
+          <p:cNvPr id="22" name="TextBox 21"/>
           <p:cNvSpPr txBox="1"/>
           <p:nvPr/>
         </p:nvSpPr>
@@ -14174,7 +14064,7 @@
               </a:defRPr>
             </a:pPr>
             <a:r>
-              <a:t>细分业务分析</a:t>
+              <a:t>SEGMENT PERFORMANCE</a:t>
             </a:r>
           </a:p>
         </p:txBody>
@@ -14289,7 +14179,7 @@
               </a:defRPr>
             </a:pPr>
             <a:r>
-              <a:t>B2B Revenue</a:t>
+              <a:t>Revenue</a:t>
             </a:r>
           </a:p>
         </p:txBody>
@@ -14325,7 +14215,7 @@
               </a:defRPr>
             </a:pPr>
             <a:r>
-              <a:t>520.0</a:t>
+              <a:t>€520M</a:t>
             </a:r>
           </a:p>
         </p:txBody>
@@ -14404,7 +14294,7 @@
               </a:defRPr>
             </a:pPr>
             <a:r>
-              <a:t>B2B Growth Pct</a:t>
+              <a:t>Growth Pct</a:t>
             </a:r>
           </a:p>
         </p:txBody>
@@ -14440,7 +14330,7 @@
               </a:defRPr>
             </a:pPr>
             <a:r>
-              <a:t>8.5</a:t>
+              <a:t>8.5%</a:t>
             </a:r>
           </a:p>
         </p:txBody>
@@ -14519,7 +14409,7 @@
               </a:defRPr>
             </a:pPr>
             <a:r>
-              <a:t>B2B Customers K</a:t>
+              <a:t>Customers K</a:t>
             </a:r>
           </a:p>
         </p:txBody>
@@ -14555,7 +14445,7 @@
               </a:defRPr>
             </a:pPr>
             <a:r>
-              <a:t>215.0</a:t>
+              <a:t>€215M</a:t>
             </a:r>
           </a:p>
         </p:txBody>
@@ -14634,7 +14524,7 @@
               </a:defRPr>
             </a:pPr>
             <a:r>
-              <a:t>B2B Share Of Revenue Pct</a:t>
+              <a:t>Share Of Revenue Pct</a:t>
             </a:r>
           </a:p>
         </p:txBody>
@@ -14670,14 +14560,38 @@
               </a:defRPr>
             </a:pPr>
             <a:r>
-              <a:t>16.8</a:t>
-            </a:r>
-          </a:p>
-        </p:txBody>
-      </p:sp>
-      <p:sp>
-        <p:nvSpPr>
-          <p:cNvPr id="18" name="TextBox 17"/>
+              <a:t>16.8%</a:t>
+            </a:r>
+          </a:p>
+        </p:txBody>
+      </p:sp>
+      <p:pic>
+        <p:nvPicPr>
+          <p:cNvPr id="18" name="Picture 17" descr="segment_2_metrics.png"/>
+          <p:cNvPicPr>
+            <a:picLocks noChangeAspect="1"/>
+          </p:cNvPicPr>
+          <p:nvPr/>
+        </p:nvPicPr>
+        <p:blipFill>
+          <a:blip r:embed="rId2"/>
+          <a:stretch>
+            <a:fillRect/>
+          </a:stretch>
+        </p:blipFill>
+        <p:spPr>
+          <a:xfrm>
+            <a:off x="5943600" y="2560320"/>
+            <a:ext cx="5486400" cy="2926080"/>
+          </a:xfrm>
+          <a:prstGeom prst="rect">
+            <a:avLst/>
+          </a:prstGeom>
+        </p:spPr>
+      </p:pic>
+      <p:sp>
+        <p:nvSpPr>
+          <p:cNvPr id="19" name="TextBox 18"/>
           <p:cNvSpPr txBox="1"/>
           <p:nvPr/>
         </p:nvSpPr>
@@ -14713,14 +14627,14 @@
       </p:sp>
       <p:sp>
         <p:nvSpPr>
-          <p:cNvPr id="19" name="TextBox 18"/>
+          <p:cNvPr id="20" name="TextBox 19"/>
           <p:cNvSpPr txBox="1"/>
           <p:nvPr/>
         </p:nvSpPr>
         <p:spPr>
           <a:xfrm>
             <a:off x="457200" y="2926080"/>
-            <a:ext cx="5029200" cy="1828800"/>
+            <a:ext cx="5029200" cy="2286000"/>
           </a:xfrm>
           <a:prstGeom prst="rect">
             <a:avLst/>
@@ -14768,7 +14682,7 @@
       </p:sp>
       <p:sp>
         <p:nvSpPr>
-          <p:cNvPr id="20" name="Rectangle 19"/>
+          <p:cNvPr id="21" name="Rectangle 20"/>
           <p:cNvSpPr/>
           <p:nvPr/>
         </p:nvSpPr>
@@ -14811,7 +14725,7 @@
       </p:sp>
       <p:sp>
         <p:nvSpPr>
-          <p:cNvPr id="21" name="TextBox 20"/>
+          <p:cNvPr id="22" name="TextBox 21"/>
           <p:cNvSpPr txBox="1"/>
           <p:nvPr/>
         </p:nvSpPr>
@@ -14973,7 +14887,7 @@
               </a:defRPr>
             </a:pPr>
             <a:r>
-              <a:t>细分业务分析</a:t>
+              <a:t>SEGMENT PERFORMANCE</a:t>
             </a:r>
           </a:p>
         </p:txBody>
@@ -15088,7 +15002,7 @@
               </a:defRPr>
             </a:pPr>
             <a:r>
-              <a:t>Tv Revenue</a:t>
+              <a:t>Revenue</a:t>
             </a:r>
           </a:p>
         </p:txBody>
@@ -15124,7 +15038,7 @@
               </a:defRPr>
             </a:pPr>
             <a:r>
-              <a:t>268.0</a:t>
+              <a:t>€268M</a:t>
             </a:r>
           </a:p>
         </p:txBody>
@@ -15203,7 +15117,7 @@
               </a:defRPr>
             </a:pPr>
             <a:r>
-              <a:t>Tv Total K</a:t>
+              <a:t>Total K</a:t>
             </a:r>
           </a:p>
         </p:txBody>
@@ -15239,7 +15153,7 @@
               </a:defRPr>
             </a:pPr>
             <a:r>
-              <a:t>7740.0</a:t>
+              <a:t>€7,740M</a:t>
             </a:r>
           </a:p>
         </p:txBody>
@@ -15318,7 +15232,7 @@
               </a:defRPr>
             </a:pPr>
             <a:r>
-              <a:t>Tv Net Adds K</a:t>
+              <a:t>Net Adds K</a:t>
             </a:r>
           </a:p>
         </p:txBody>
@@ -15354,7 +15268,7 @@
               </a:defRPr>
             </a:pPr>
             <a:r>
-              <a:t>-6.0</a:t>
+              <a:t>-6</a:t>
             </a:r>
           </a:p>
         </p:txBody>
@@ -15469,14 +15383,38 @@
               </a:defRPr>
             </a:pPr>
             <a:r>
-              <a:t>4900.0</a:t>
-            </a:r>
-          </a:p>
-        </p:txBody>
-      </p:sp>
-      <p:sp>
-        <p:nvSpPr>
-          <p:cNvPr id="18" name="TextBox 17"/>
+              <a:t>€4,900M</a:t>
+            </a:r>
+          </a:p>
+        </p:txBody>
+      </p:sp>
+      <p:pic>
+        <p:nvPicPr>
+          <p:cNvPr id="18" name="Picture 17" descr="segment_3_metrics.png"/>
+          <p:cNvPicPr>
+            <a:picLocks noChangeAspect="1"/>
+          </p:cNvPicPr>
+          <p:nvPr/>
+        </p:nvPicPr>
+        <p:blipFill>
+          <a:blip r:embed="rId2"/>
+          <a:stretch>
+            <a:fillRect/>
+          </a:stretch>
+        </p:blipFill>
+        <p:spPr>
+          <a:xfrm>
+            <a:off x="5943600" y="2560320"/>
+            <a:ext cx="5486400" cy="2926080"/>
+          </a:xfrm>
+          <a:prstGeom prst="rect">
+            <a:avLst/>
+          </a:prstGeom>
+        </p:spPr>
+      </p:pic>
+      <p:sp>
+        <p:nvSpPr>
+          <p:cNvPr id="19" name="TextBox 18"/>
           <p:cNvSpPr txBox="1"/>
           <p:nvPr/>
         </p:nvSpPr>
@@ -15512,14 +15450,14 @@
       </p:sp>
       <p:sp>
         <p:nvSpPr>
-          <p:cNvPr id="19" name="TextBox 18"/>
+          <p:cNvPr id="20" name="TextBox 19"/>
           <p:cNvSpPr txBox="1"/>
           <p:nvPr/>
         </p:nvSpPr>
         <p:spPr>
           <a:xfrm>
             <a:off x="457200" y="2926080"/>
-            <a:ext cx="5029200" cy="1828800"/>
+            <a:ext cx="5029200" cy="2286000"/>
           </a:xfrm>
           <a:prstGeom prst="rect">
             <a:avLst/>
@@ -15583,7 +15521,7 @@
       </p:sp>
       <p:sp>
         <p:nvSpPr>
-          <p:cNvPr id="20" name="Rectangle 19"/>
+          <p:cNvPr id="21" name="Rectangle 20"/>
           <p:cNvSpPr/>
           <p:nvPr/>
         </p:nvSpPr>
@@ -15626,7 +15564,7 @@
       </p:sp>
       <p:sp>
         <p:nvSpPr>
-          <p:cNvPr id="21" name="TextBox 20"/>
+          <p:cNvPr id="22" name="TextBox 21"/>
           <p:cNvSpPr txBox="1"/>
           <p:nvPr/>
         </p:nvSpPr>
@@ -15788,7 +15726,7 @@
               </a:defRPr>
             </a:pPr>
             <a:r>
-              <a:t>网络分析</a:t>
+              <a:t>INFRASTRUCTURE</a:t>
             </a:r>
           </a:p>
         </p:txBody>
@@ -15923,7 +15861,7 @@
               </a:defRPr>
             </a:pPr>
             <a:r>
-              <a:t>• Mobile Vendor: Ericsson + Nokia (non-standalone 5G)</a:t>
+              <a:t>• Mobile Vendor: Ericsson + Nokia (non-standalone 5G</a:t>
             </a:r>
           </a:p>
           <a:p>
@@ -16267,7 +16205,7 @@
               </a:defRPr>
             </a:pPr>
             <a:r>
-              <a:t>商业模式画布</a:t>
+              <a:t>BMC</a:t>
             </a:r>
           </a:p>
         </p:txBody>
@@ -16539,7 +16477,7 @@
               </a:defRPr>
             </a:pPr>
             <a:r>
-              <a:t>组织与人才</a:t>
+              <a:t>PEOPLE &amp; CULTURE</a:t>
             </a:r>
           </a:p>
         </p:txBody>
@@ -16787,7 +16725,7 @@
               </a:defRPr>
             </a:pPr>
             <a:r>
-              <a:t>数据质量概览</a:t>
+              <a:t>DATA QUALITY</a:t>
             </a:r>
           </a:p>
         </p:txBody>
@@ -17442,7 +17380,7 @@
               </a:defRPr>
             </a:pPr>
             <a:r>
-              <a:t>Key Message: 19 data points tracked, 0 high-confidence (0%)</a:t>
+              <a:t>Key Message: 19 data points tracked, 0 high-confidence (0%</a:t>
             </a:r>
           </a:p>
         </p:txBody>
@@ -17575,7 +17513,7 @@
               </a:defRPr>
             </a:pPr>
             <a:r>
-              <a:t>优势/劣势/风险暴露点</a:t>
+              <a:t>SELF ASSESSMENT</a:t>
             </a:r>
           </a:p>
         </p:txBody>
@@ -17686,7 +17624,7 @@
               </a:defRPr>
             </a:pPr>
             <a:r>
-              <a:t>• Brand Strength: score 82 (market avg 78)</a:t>
+              <a:t>• Brand Strength: score 82 (market avg 78</a:t>
             </a:r>
           </a:p>
           <a:p>
@@ -17702,7 +17640,7 @@
               </a:defRPr>
             </a:pPr>
             <a:r>
-              <a:t>• Enterprise Solutions: score 82 (market avg 74)</a:t>
+              <a:t>• Enterprise Solutions: score 82 (market avg 74</a:t>
             </a:r>
           </a:p>
           <a:p>
@@ -17718,7 +17656,7 @@
               </a:defRPr>
             </a:pPr>
             <a:r>
-              <a:t>• Network Coverage: score 80 (market avg 76)</a:t>
+              <a:t>• Network Coverage: score 80 (market avg 76</a:t>
             </a:r>
           </a:p>
           <a:p>
@@ -17841,7 +17779,7 @@
               </a:defRPr>
             </a:pPr>
             <a:r>
-              <a:t>• Customer Service: score 70 (market avg 74)</a:t>
+              <a:t>• Customer Service: score 70 (market avg 74</a:t>
             </a:r>
           </a:p>
           <a:p>
@@ -17857,7 +17795,7 @@
               </a:defRPr>
             </a:pPr>
             <a:r>
-              <a:t>• Pricing Competitiveness: score 72 (market avg 78)</a:t>
+              <a:t>• Pricing Competitiveness: score 72 (market avg 78</a:t>
             </a:r>
           </a:p>
         </p:txBody>
@@ -18011,7 +17949,7 @@
               </a:defRPr>
             </a:pPr>
             <a:r>
-              <a:t>Key Message: Ranked #2 of 4 operators in market; revenue EUR 3092.0M; EBITDA margin 36.2%; stable but facing challenges; key strength: Brand Strength; key challenge: Customer Service; Management outlook: 德国EBITDA：H2表现优于H1，但FY26不会回到正增长。关键顺风因素：(1) MDU同比基数效应Q3开始消退；(2) 1&amp;1批发收入Q4达到完整运行率(full run-rate)；(3) MVNO基数效应。预计FY27才能真正实现E</a:t>
+              <a:t>Key Message: Ranked #2 of 4 operators in market; revenue EUR 3092.0M; EBITDA margin 36.2%; stable but facing challenges; key strength: Brand Strength; key challenge: Customer Service; Management outlook: EBITDAH2H1FY26(1) MDUQ3(2) 1&amp;1Q4(full run-rate)(3) MVNOFY27E</a:t>
             </a:r>
           </a:p>
         </p:txBody>
@@ -18108,7 +18046,7 @@
               </a:defRPr>
             </a:pPr>
             <a:r>
-              <a:t>SWOT 综合分析</a:t>
+              <a:t>SWOT Synthesis</a:t>
             </a:r>
           </a:p>
         </p:txBody>
@@ -18144,7 +18082,7 @@
               </a:defRPr>
             </a:pPr>
             <a:r>
-              <a:t>SWOT Synthesis</a:t>
+              <a:t>Strengths, Weaknesses, Opportunities &amp; Threats</a:t>
             </a:r>
           </a:p>
         </p:txBody>
@@ -18277,7 +18215,7 @@
               </a:defRPr>
             </a:pPr>
             <a:r>
-              <a:t>SWOT 综合分析</a:t>
+              <a:t>STRATEGIC SYNTHESIS</a:t>
             </a:r>
           </a:p>
         </p:txBody>
@@ -18801,7 +18739,7 @@
               </a:defRPr>
             </a:pPr>
             <a:r>
-              <a:t>05 看机会</a:t>
+              <a:t>05 Look at Opportunities</a:t>
             </a:r>
           </a:p>
         </p:txBody>
@@ -18837,7 +18775,7 @@
               </a:defRPr>
             </a:pPr>
             <a:r>
-              <a:t>Look at Opportunities — SPAN Matrix</a:t>
+              <a:t>SPAN Matrix — Opportunity Selection</a:t>
             </a:r>
           </a:p>
         </p:txBody>
@@ -18970,7 +18908,7 @@
               </a:defRPr>
             </a:pPr>
             <a:r>
-              <a:t>机会定位矩阵</a:t>
+              <a:t>OPPORTUNITY MAP</a:t>
             </a:r>
           </a:p>
         </p:txBody>
@@ -19242,7 +19180,7 @@
               </a:defRPr>
             </a:pPr>
             <a:r>
-              <a:t>机会优先级排序</a:t>
+              <a:t>PRIORITIES</a:t>
             </a:r>
           </a:p>
         </p:txBody>
@@ -19514,7 +19452,7 @@
               </a:defRPr>
             </a:pPr>
             <a:r>
-              <a:t>机会详情</a:t>
+              <a:t>DEEP DIVE</a:t>
             </a:r>
           </a:p>
         </p:txBody>
@@ -19744,7 +19682,7 @@
               </a:defRPr>
             </a:pPr>
             <a:r>
-              <a:t>Market: N/A | Window: </a:t>
+              <a:t>Market: N/A | Window:</a:t>
             </a:r>
           </a:p>
         </p:txBody>
@@ -19974,7 +19912,7 @@
               </a:defRPr>
             </a:pPr>
             <a:r>
-              <a:t>Market: N/A | Window: </a:t>
+              <a:t>Market: N/A | Window:</a:t>
             </a:r>
           </a:p>
         </p:txBody>
@@ -20204,7 +20142,7 @@
               </a:defRPr>
             </a:pPr>
             <a:r>
-              <a:t>Market: N/A | Window: </a:t>
+              <a:t>Market: N/A | Window:</a:t>
             </a:r>
           </a:p>
         </p:txBody>
@@ -20434,7 +20372,7 @@
               </a:defRPr>
             </a:pPr>
             <a:r>
-              <a:t>Market: N/A | Window: </a:t>
+              <a:t>Market: N/A | Window:</a:t>
             </a:r>
           </a:p>
         </p:txBody>
@@ -20682,7 +20620,7 @@
               </a:defRPr>
             </a:pPr>
             <a:r>
-              <a:t>分析总结</a:t>
+              <a:t>KEY TAKEAWAYS</a:t>
             </a:r>
           </a:p>
         </p:txBody>
@@ -20833,7 +20771,7 @@
               </a:defRPr>
             </a:pPr>
             <a:r>
-              <a:t>Macro environment: Favorable. Key opportunities: Regulatory Environment, National Digital Strategy. Key risks: Regulatory Environment, Fiber Broadband Penetration.. Industry is mature. (+0.3% YoY (CQ2_2025 -&gt; CQ4_2025))</a:t>
+              <a:t>Macro environment: Favorable. Key opportunities: Regulatory Environment, National Digital Strategy. Key risks: Regulatory Environment, Fiber Broadband Penetration.. Industry is mature. (+0.3% YoY (CQ2_2025 -&gt; CQ4_2025)</a:t>
             </a:r>
           </a:p>
         </p:txBody>
@@ -21178,7 +21116,7 @@
               </a:defRPr>
             </a:pPr>
             <a:r>
-              <a:t>Ranked #2 of 4 operators in market; revenue EUR 3092.0M; EBITDA margin 36.2%; stable but facing challenges; key strength: Brand Strength; key challenge: Customer Service; Management outlook: 德国EBITDA：H2表现优于H1，但FY26不会回到正增长。关键顺风因素：(1) MDU同比基数效应Q3开始消退；(2) 1&amp;1批发收入Q4达到完整运行率(full run-rate)；(3) MVNO基数效应。预计FY27才能真正实现E</a:t>
+              <a:t>Ranked #2 of 4 operators in market; revenue EUR 3092.0M; EBITDA margin 36.2%; stable but facing challenges; key strength: Brand Strength; key challenge: Customer Service; Management outlook: EBITDAH2H1FY26(1) MDUQ3(2) 1&amp;1Q4(full run-rate)(3) MVNOFY27E</a:t>
             </a:r>
           </a:p>
         </p:txBody>
@@ -21620,7 +21558,7 @@
               </a:defRPr>
             </a:pPr>
             <a:r>
-              <a:t>数据溯源</a:t>
+              <a:t>SOURCES &amp; METHODOLOGY</a:t>
             </a:r>
           </a:p>
         </p:txBody>
@@ -22014,42 +21952,6 @@
         </p:nvSpPr>
         <p:spPr>
           <a:xfrm>
-            <a:off x="457200" y="777240"/>
-            <a:ext cx="9144000" cy="320040"/>
-          </a:xfrm>
-          <a:prstGeom prst="rect">
-            <a:avLst/>
-          </a:prstGeom>
-          <a:noFill/>
-        </p:spPr>
-        <p:txBody>
-          <a:bodyPr wrap="square">
-            <a:spAutoFit/>
-          </a:bodyPr>
-          <a:lstStyle/>
-          <a:p>
-            <a:pPr algn="l">
-              <a:defRPr sz="1200" b="1">
-                <a:solidFill>
-                  <a:srgbClr val="E60000"/>
-                </a:solidFill>
-                <a:latin typeface="Arial"/>
-              </a:defRPr>
-            </a:pPr>
-            <a:r>
-              <a:t>执行摘要</a:t>
-            </a:r>
-          </a:p>
-        </p:txBody>
-      </p:sp>
-      <p:sp>
-        <p:nvSpPr>
-          <p:cNvPr id="5" name="TextBox 4"/>
-          <p:cNvSpPr txBox="1"/>
-          <p:nvPr/>
-        </p:nvSpPr>
-        <p:spPr>
-          <a:xfrm>
             <a:off x="11247120" y="6400800"/>
             <a:ext cx="731520" cy="320040"/>
           </a:xfrm>
@@ -22080,7 +21982,7 @@
       </p:sp>
       <p:sp>
         <p:nvSpPr>
-          <p:cNvPr id="6" name="Rectangle 5"/>
+          <p:cNvPr id="5" name="Rectangle 4"/>
           <p:cNvSpPr/>
           <p:nvPr/>
         </p:nvSpPr>
@@ -22123,7 +22025,7 @@
       </p:sp>
       <p:sp>
         <p:nvSpPr>
-          <p:cNvPr id="7" name="TextBox 6"/>
+          <p:cNvPr id="6" name="TextBox 5"/>
           <p:cNvSpPr txBox="1"/>
           <p:nvPr/>
         </p:nvSpPr>
@@ -22159,7 +22061,7 @@
       </p:sp>
       <p:sp>
         <p:nvSpPr>
-          <p:cNvPr id="8" name="TextBox 7"/>
+          <p:cNvPr id="7" name="TextBox 6"/>
           <p:cNvSpPr txBox="1"/>
           <p:nvPr/>
         </p:nvSpPr>
@@ -22188,14 +22090,14 @@
               </a:defRPr>
             </a:pPr>
             <a:r>
-              <a:t>Macro environment: Favorable. Key opportunities: Regulatory Environment, National Digital Strategy. Key risks: Regulatory Environment, Fiber Broadband Penetration.. Industry is mature. (+0.3% YoY (CQ2_2025 -&gt; CQ4_2025))</a:t>
-            </a:r>
-          </a:p>
-        </p:txBody>
-      </p:sp>
-      <p:sp>
-        <p:nvSpPr>
-          <p:cNvPr id="9" name="Rectangle 8"/>
+              <a:t>Macro environment: Favorable. Key opportunities: Regulatory Environment, National Digital Strategy. Key risks: Regulatory Environment, Fiber Broadband Penetration.. Industry is mature. (+0.3% YoY (CQ2_2025 -&gt; CQ4_2025)</a:t>
+            </a:r>
+          </a:p>
+        </p:txBody>
+      </p:sp>
+      <p:sp>
+        <p:nvSpPr>
+          <p:cNvPr id="8" name="Rectangle 7"/>
           <p:cNvSpPr/>
           <p:nvPr/>
         </p:nvSpPr>
@@ -22238,7 +22140,7 @@
       </p:sp>
       <p:sp>
         <p:nvSpPr>
-          <p:cNvPr id="10" name="TextBox 9"/>
+          <p:cNvPr id="9" name="TextBox 8"/>
           <p:cNvSpPr txBox="1"/>
           <p:nvPr/>
         </p:nvSpPr>
@@ -22274,7 +22176,7 @@
       </p:sp>
       <p:sp>
         <p:nvSpPr>
-          <p:cNvPr id="11" name="TextBox 10"/>
+          <p:cNvPr id="10" name="TextBox 9"/>
           <p:cNvSpPr txBox="1"/>
           <p:nvPr/>
         </p:nvSpPr>
@@ -22310,7 +22212,7 @@
       </p:sp>
       <p:sp>
         <p:nvSpPr>
-          <p:cNvPr id="12" name="Rectangle 11"/>
+          <p:cNvPr id="11" name="Rectangle 10"/>
           <p:cNvSpPr/>
           <p:nvPr/>
         </p:nvSpPr>
@@ -22353,7 +22255,7 @@
       </p:sp>
       <p:sp>
         <p:nvSpPr>
-          <p:cNvPr id="13" name="TextBox 12"/>
+          <p:cNvPr id="12" name="TextBox 11"/>
           <p:cNvSpPr txBox="1"/>
           <p:nvPr/>
         </p:nvSpPr>
@@ -22389,7 +22291,7 @@
       </p:sp>
       <p:sp>
         <p:nvSpPr>
-          <p:cNvPr id="14" name="TextBox 13"/>
+          <p:cNvPr id="13" name="TextBox 12"/>
           <p:cNvSpPr txBox="1"/>
           <p:nvPr/>
         </p:nvSpPr>
@@ -22425,7 +22327,7 @@
       </p:sp>
       <p:sp>
         <p:nvSpPr>
-          <p:cNvPr id="15" name="Rectangle 14"/>
+          <p:cNvPr id="14" name="Rectangle 13"/>
           <p:cNvSpPr/>
           <p:nvPr/>
         </p:nvSpPr>
@@ -22468,7 +22370,7 @@
       </p:sp>
       <p:sp>
         <p:nvSpPr>
-          <p:cNvPr id="16" name="TextBox 15"/>
+          <p:cNvPr id="15" name="TextBox 14"/>
           <p:cNvSpPr txBox="1"/>
           <p:nvPr/>
         </p:nvSpPr>
@@ -22504,7 +22406,7 @@
       </p:sp>
       <p:sp>
         <p:nvSpPr>
-          <p:cNvPr id="17" name="TextBox 16"/>
+          <p:cNvPr id="16" name="TextBox 15"/>
           <p:cNvSpPr txBox="1"/>
           <p:nvPr/>
         </p:nvSpPr>
@@ -22533,14 +22435,14 @@
               </a:defRPr>
             </a:pPr>
             <a:r>
-              <a:t>Ranked #2 of 4 operators in market; revenue EUR 3092.0M; EBITDA margin 36.2%; stable but facing challenges; key strength: Brand Strength; key challenge: Customer Service; Management outlook: 德国EBITDA：H2表现优于H1，但FY26不会回到正增长。关键顺风因素：(1) MDU同比基数效应Q3开始消退；(2) 1&amp;1批发收入Q4达到完整运行率(full run-rate)；(3) MVNO基数效应。预计FY27才能真正实现E</a:t>
-            </a:r>
-          </a:p>
-        </p:txBody>
-      </p:sp>
-      <p:sp>
-        <p:nvSpPr>
-          <p:cNvPr id="18" name="Rectangle 17"/>
+              <a:t>Ranked #2 of 4 operators in market; revenue EUR 3092.0M; EBITDA margin 36.2%; stable but facing challenges; key strength: Brand Strength; key challenge: Customer Service; Management outlook: EBITDAH2H1FY26(1) MDUQ3(2) 1&amp;1Q4(full run-rate)(3) MVNOFY27E</a:t>
+            </a:r>
+          </a:p>
+        </p:txBody>
+      </p:sp>
+      <p:sp>
+        <p:nvSpPr>
+          <p:cNvPr id="17" name="Rectangle 16"/>
           <p:cNvSpPr/>
           <p:nvPr/>
         </p:nvSpPr>
@@ -22583,7 +22485,7 @@
       </p:sp>
       <p:sp>
         <p:nvSpPr>
-          <p:cNvPr id="19" name="TextBox 18"/>
+          <p:cNvPr id="18" name="TextBox 17"/>
           <p:cNvSpPr txBox="1"/>
           <p:nvPr/>
         </p:nvSpPr>
@@ -22619,7 +22521,7 @@
       </p:sp>
       <p:sp>
         <p:nvSpPr>
-          <p:cNvPr id="20" name="TextBox 19"/>
+          <p:cNvPr id="19" name="TextBox 18"/>
           <p:cNvSpPr txBox="1"/>
           <p:nvPr/>
         </p:nvSpPr>
@@ -22655,7 +22557,7 @@
       </p:sp>
       <p:sp>
         <p:nvSpPr>
-          <p:cNvPr id="21" name="Rectangle 20"/>
+          <p:cNvPr id="20" name="Rectangle 19"/>
           <p:cNvSpPr/>
           <p:nvPr/>
         </p:nvSpPr>
@@ -22698,7 +22600,7 @@
       </p:sp>
       <p:sp>
         <p:nvSpPr>
-          <p:cNvPr id="22" name="TextBox 21"/>
+          <p:cNvPr id="21" name="TextBox 20"/>
           <p:cNvSpPr txBox="1"/>
           <p:nvPr/>
         </p:nvSpPr>
@@ -22734,7 +22636,7 @@
       </p:sp>
       <p:sp>
         <p:nvSpPr>
-          <p:cNvPr id="23" name="TextBox 22"/>
+          <p:cNvPr id="22" name="TextBox 21"/>
           <p:cNvSpPr txBox="1"/>
           <p:nvPr/>
         </p:nvSpPr>
@@ -22770,7 +22672,7 @@
       </p:sp>
       <p:sp>
         <p:nvSpPr>
-          <p:cNvPr id="24" name="Rectangle 23"/>
+          <p:cNvPr id="23" name="Rectangle 22"/>
           <p:cNvSpPr/>
           <p:nvPr/>
         </p:nvSpPr>
@@ -22813,7 +22715,7 @@
       </p:sp>
       <p:sp>
         <p:nvSpPr>
-          <p:cNvPr id="25" name="TextBox 24"/>
+          <p:cNvPr id="24" name="TextBox 23"/>
           <p:cNvSpPr txBox="1"/>
           <p:nvPr/>
         </p:nvSpPr>
@@ -22939,7 +22841,7 @@
               </a:defRPr>
             </a:pPr>
             <a:r>
-              <a:t>01 看趋势</a:t>
+              <a:t>01 Look at Trends</a:t>
             </a:r>
           </a:p>
         </p:txBody>
@@ -22975,7 +22877,7 @@
               </a:defRPr>
             </a:pPr>
             <a:r>
-              <a:t>Look at Trends — PEST Framework</a:t>
+              <a:t>PEST Framework — Macro Environment</a:t>
             </a:r>
           </a:p>
         </p:txBody>
@@ -23108,7 +23010,7 @@
               </a:defRPr>
             </a:pPr>
             <a:r>
-              <a:t>宏观环境分析</a:t>
+              <a:t>MACRO ENVIRONMENT</a:t>
             </a:r>
           </a:p>
         </p:txBody>
@@ -23380,7 +23282,7 @@
               </a:defRPr>
             </a:pPr>
             <a:r>
-              <a:t>行业环境</a:t>
+              <a:t>INDUSTRY ANALYSIS</a:t>
             </a:r>
           </a:p>
         </p:txBody>
@@ -23455,7 +23357,7 @@
               </a:defRPr>
             </a:pPr>
             <a:r>
-              <a:t>• Market Size: EUR 12.3B (quarterly, CQ4_2025)</a:t>
+              <a:t>• Market Size: EUR 12.3B (quarterly, CQ4_2025</a:t>
             </a:r>
           </a:p>
           <a:p>
@@ -23471,7 +23373,7 @@
               </a:defRPr>
             </a:pPr>
             <a:r>
-              <a:t>• Growth Rate: +0.3% YoY (CQ2_2025 -&gt; CQ4_2025)</a:t>
+              <a:t>• Growth Rate: +0.3% YoY (CQ2_2025 -&gt; CQ4_2025</a:t>
             </a:r>
           </a:p>
           <a:p>
@@ -23487,7 +23389,7 @@
               </a:defRPr>
             </a:pPr>
             <a:r>
-              <a:t>• Profit Trend: Stable (industry EBITDA margin ~36.6%)</a:t>
+              <a:t>• Profit Trend: Stable (industry EBITDA margin ~36.6%</a:t>
             </a:r>
           </a:p>
           <a:p>
@@ -23503,7 +23405,7 @@
               </a:defRPr>
             </a:pPr>
             <a:r>
-              <a:t>• Concentration: CR4 = 100% (Deutsche Telekom: 50.3%, Vodafone Germany: 25.1%, Telefonica O2 Germany: 16.2%, 1&amp;1 AG: 8.4%)</a:t>
+              <a:t>• Concentration: CR4 = 100% (Deutsche Telekom: 50.3%, Vodafone Germany: 25.1%, Telefonica O2 Germany: 16.2%, 1&amp;1 AG: 8.4%</a:t>
             </a:r>
           </a:p>
           <a:p>
@@ -23574,7 +23476,7 @@
               </a:defRPr>
             </a:pPr>
             <a:r>
-              <a:t>•   FWA (Fixed Wireless Access) as fiber alternative</a:t>
+              <a:t>• FWA (Fixed Wireless Access) as fiber alternative</a:t>
             </a:r>
           </a:p>
           <a:p>
@@ -23590,7 +23492,7 @@
               </a:defRPr>
             </a:pPr>
             <a:r>
-              <a:t>•   Network-as-a-Service for enterprise verticals</a:t>
+              <a:t>• Network-as-a-Service for enterprise verticals</a:t>
             </a:r>
           </a:p>
           <a:p>
@@ -23606,7 +23508,7 @@
               </a:defRPr>
             </a:pPr>
             <a:r>
-              <a:t>•   Wholesale/MVNO partnerships for coverage monetization</a:t>
+              <a:t>• Wholesale/MVNO partnerships for coverage monetization</a:t>
             </a:r>
           </a:p>
           <a:p>
@@ -23638,7 +23540,7 @@
               </a:defRPr>
             </a:pPr>
             <a:r>
-              <a:t>•   5G SA enabling network slicing and enterprise services</a:t>
+              <a:t>• 5G SA enabling network slicing and enterprise services</a:t>
             </a:r>
           </a:p>
           <a:p>
@@ -23654,7 +23556,7 @@
               </a:defRPr>
             </a:pPr>
             <a:r>
-              <a:t>•   AI/ML for network optimization and customer experience</a:t>
+              <a:t>• AI/ML for network optimization and customer experience</a:t>
             </a:r>
           </a:p>
           <a:p>
@@ -23670,7 +23572,7 @@
               </a:defRPr>
             </a:pPr>
             <a:r>
-              <a:t>•   Open RAN for vendor diversification and cost reduction</a:t>
+              <a:t>• Open RAN for vendor diversification and cost reduction</a:t>
             </a:r>
           </a:p>
         </p:txBody>
@@ -23793,7 +23695,7 @@
               </a:defRPr>
             </a:pPr>
             <a:r>
-              <a:t>• Operational efficiency (OPEX/revenue ratio)</a:t>
+              <a:t>• Operational efficiency (OPEX/revenue ratio</a:t>
             </a:r>
           </a:p>
         </p:txBody>
@@ -23872,7 +23774,7 @@
               </a:defRPr>
             </a:pPr>
             <a:r>
-              <a:t>Key Message: Macro environment: Favorable. Key opportunities: Regulatory Environment, National Digital Strategy. Key risks: Regulatory Environment, Fiber Broadband Penetration.. Industry is mature. (+0.3% YoY (CQ2_2025 -&gt; CQ4_2025))</a:t>
+              <a:t>Key Message: Macro environment: Favorable. Key opportunities: Regulatory Environment, National Digital Strategy. Key risks: Regulatory Environment, Fiber Broadband Penetration.. Industry is mature. (+0.3% YoY (CQ2_2025 -&gt; CQ4_2025)</a:t>
             </a:r>
           </a:p>
         </p:txBody>
@@ -24005,7 +23907,7 @@
               </a:defRPr>
             </a:pPr>
             <a:r>
-              <a:t>价值转移趋势</a:t>
+              <a:t>VALUE MIGRATION</a:t>
             </a:r>
           </a:p>
         </p:txBody>
@@ -24191,7 +24093,7 @@
               </a:defRPr>
             </a:pPr>
             <a:r>
-              <a:t>Key Message: Macro environment: Favorable. Key opportunities: Regulatory Environment, National Digital Strategy. Key risks: Regulatory Environment, Fiber Broadband Penetration.. Industry is mature. (+0.3% YoY (CQ2_2025 -&gt; CQ4_2025))</a:t>
+              <a:t>Key Message: Macro environment: Favorable. Key opportunities: Regulatory Environment, National Digital Strategy. Key risks: Regulatory Environment, Fiber Broadband Penetration.. Industry is mature. (+0.3% YoY (CQ2_2025 -&gt; CQ4_2025)</a:t>
             </a:r>
           </a:p>
         </p:txBody>
@@ -24288,7 +24190,7 @@
               </a:defRPr>
             </a:pPr>
             <a:r>
-              <a:t>02 看市场/客户</a:t>
+              <a:t>02 Look at Market</a:t>
             </a:r>
           </a:p>
         </p:txBody>
@@ -24324,7 +24226,7 @@
               </a:defRPr>
             </a:pPr>
             <a:r>
-              <a:t>Look at Market/Customer — $APPEALS</a:t>
+              <a:t>$APPEALS — Market Changes &amp; Customer Needs</a:t>
             </a:r>
           </a:p>
         </p:txBody>

</xml_diff>